<commit_message>
Updates slides for intro & lesson 2
</commit_message>
<xml_diff>
--- a/lesson-2/Slides.pptx
+++ b/lesson-2/Slides.pptx
@@ -5,17 +5,19 @@
     <p:sldMasterId id="2147483648" r:id="rId1"/>
   </p:sldMasterIdLst>
   <p:notesMasterIdLst>
-    <p:notesMasterId r:id="rId7"/>
+    <p:notesMasterId r:id="rId9"/>
   </p:notesMasterIdLst>
   <p:handoutMasterIdLst>
-    <p:handoutMasterId r:id="rId8"/>
+    <p:handoutMasterId r:id="rId10"/>
   </p:handoutMasterIdLst>
   <p:sldIdLst>
     <p:sldId id="524" r:id="rId2"/>
-    <p:sldId id="529" r:id="rId3"/>
-    <p:sldId id="530" r:id="rId4"/>
-    <p:sldId id="531" r:id="rId5"/>
-    <p:sldId id="532" r:id="rId6"/>
+    <p:sldId id="534" r:id="rId3"/>
+    <p:sldId id="529" r:id="rId4"/>
+    <p:sldId id="530" r:id="rId5"/>
+    <p:sldId id="533" r:id="rId6"/>
+    <p:sldId id="531" r:id="rId7"/>
+    <p:sldId id="532" r:id="rId8"/>
   </p:sldIdLst>
   <p:sldSz cx="12192000" cy="6858000"/>
   <p:notesSz cx="6858000" cy="9144000"/>
@@ -120,8 +122,10 @@
         <p14:section name="Intro" id="{68159F7C-7154-1446-A846-3755D3722C1C}">
           <p14:sldIdLst>
             <p14:sldId id="524"/>
+            <p14:sldId id="534"/>
             <p14:sldId id="529"/>
             <p14:sldId id="530"/>
+            <p14:sldId id="533"/>
             <p14:sldId id="531"/>
             <p14:sldId id="532"/>
           </p14:sldIdLst>
@@ -813,6 +817,118 @@
           <a:lstStyle/>
           <a:p>
             <a:r>
+              <a:rPr lang="en-US" dirty="0" smtClean="0"/>
+              <a:t>In this lesson we’re going to create our web site</a:t>
+            </a:r>
+            <a:r>
+              <a:rPr lang="is-IS" dirty="0" smtClean="0"/>
+              <a:t>… It’s a basic HTML</a:t>
+            </a:r>
+            <a:r>
+              <a:rPr lang="is-IS" baseline="0" dirty="0" smtClean="0"/>
+              <a:t> &amp; JS web application. We’ve built it using jQuery just to keep things simple. For anything non-trivial we’d recommend using a proper frontend framework like Angular JS.</a:t>
+            </a:r>
+          </a:p>
+          <a:p>
+            <a:endParaRPr lang="is-IS" baseline="0" dirty="0" smtClean="0"/>
+          </a:p>
+          <a:p>
+            <a:r>
+              <a:rPr lang="is-IS" baseline="0" dirty="0" smtClean="0"/>
+              <a:t>We’re also going to hook up authentication... </a:t>
+            </a:r>
+            <a:r>
+              <a:rPr lang="en-US" baseline="0" dirty="0" smtClean="0"/>
+              <a:t>A</a:t>
+            </a:r>
+            <a:r>
+              <a:rPr lang="is-IS" baseline="0" dirty="0" smtClean="0"/>
+              <a:t>llowing users to sign up &amp; login. In the spirit of our serverless architecture principles, we’re not going to build this ourselves, we’re going to use a service called Auth0...</a:t>
+            </a:r>
+          </a:p>
+        </p:txBody>
+      </p:sp>
+      <p:sp>
+        <p:nvSpPr>
+          <p:cNvPr id="4" name="Slide Number Placeholder 3"/>
+          <p:cNvSpPr>
+            <a:spLocks noGrp="1"/>
+          </p:cNvSpPr>
+          <p:nvPr>
+            <p:ph type="sldNum" sz="quarter" idx="10"/>
+          </p:nvPr>
+        </p:nvSpPr>
+        <p:spPr/>
+        <p:txBody>
+          <a:bodyPr/>
+          <a:lstStyle/>
+          <a:p>
+            <a:fld id="{55C38DD1-33AA-4996-977A-42B26A155BBE}" type="slidenum">
+              <a:rPr lang="id-ID" smtClean="0"/>
+              <a:t>2</a:t>
+            </a:fld>
+            <a:endParaRPr lang="id-ID"/>
+          </a:p>
+        </p:txBody>
+      </p:sp>
+    </p:spTree>
+    <p:extLst>
+      <p:ext uri="{BB962C8B-B14F-4D97-AF65-F5344CB8AC3E}">
+        <p14:creationId xmlns:p14="http://schemas.microsoft.com/office/powerpoint/2010/main" val="566071019"/>
+      </p:ext>
+    </p:extLst>
+  </p:cSld>
+  <p:clrMapOvr>
+    <a:masterClrMapping/>
+  </p:clrMapOvr>
+</p:notes>
+</file>
+
+<file path=ppt/notesSlides/notesSlide3.xml><?xml version="1.0" encoding="utf-8"?>
+<p:notes xmlns:a="http://schemas.openxmlformats.org/drawingml/2006/main" xmlns:r="http://schemas.openxmlformats.org/officeDocument/2006/relationships" xmlns:p="http://schemas.openxmlformats.org/presentationml/2006/main">
+  <p:cSld>
+    <p:spTree>
+      <p:nvGrpSpPr>
+        <p:cNvPr id="1" name=""/>
+        <p:cNvGrpSpPr/>
+        <p:nvPr/>
+      </p:nvGrpSpPr>
+      <p:grpSpPr>
+        <a:xfrm>
+          <a:off x="0" y="0"/>
+          <a:ext cx="0" cy="0"/>
+          <a:chOff x="0" y="0"/>
+          <a:chExt cx="0" cy="0"/>
+        </a:xfrm>
+      </p:grpSpPr>
+      <p:sp>
+        <p:nvSpPr>
+          <p:cNvPr id="2" name="Slide Image Placeholder 1"/>
+          <p:cNvSpPr>
+            <a:spLocks noGrp="1" noRot="1" noChangeAspect="1"/>
+          </p:cNvSpPr>
+          <p:nvPr>
+            <p:ph type="sldImg"/>
+          </p:nvPr>
+        </p:nvSpPr>
+        <p:spPr/>
+      </p:sp>
+      <p:sp>
+        <p:nvSpPr>
+          <p:cNvPr id="3" name="Notes Placeholder 2"/>
+          <p:cNvSpPr>
+            <a:spLocks noGrp="1"/>
+          </p:cNvSpPr>
+          <p:nvPr>
+            <p:ph type="body" idx="1"/>
+          </p:nvPr>
+        </p:nvSpPr>
+        <p:spPr/>
+        <p:txBody>
+          <a:bodyPr/>
+          <a:lstStyle/>
+          <a:p>
+            <a:r>
               <a:rPr lang="en-US" sz="1200" u="none" kern="1200" baseline="0" dirty="0" smtClean="0">
                 <a:solidFill>
                   <a:schemeClr val="tx1"/>
@@ -1065,7 +1181,7 @@
           <a:p>
             <a:fld id="{55C38DD1-33AA-4996-977A-42B26A155BBE}" type="slidenum">
               <a:rPr lang="id-ID" smtClean="0"/>
-              <a:t>2</a:t>
+              <a:t>3</a:t>
             </a:fld>
             <a:endParaRPr lang="id-ID"/>
           </a:p>
@@ -1084,7 +1200,7 @@
 </p:notes>
 </file>
 
-<file path=ppt/notesSlides/notesSlide3.xml><?xml version="1.0" encoding="utf-8"?>
+<file path=ppt/notesSlides/notesSlide4.xml><?xml version="1.0" encoding="utf-8"?>
 <p:notes xmlns:a="http://schemas.openxmlformats.org/drawingml/2006/main" xmlns:r="http://schemas.openxmlformats.org/officeDocument/2006/relationships" xmlns:p="http://schemas.openxmlformats.org/presentationml/2006/main">
   <p:cSld>
     <p:spTree>
@@ -1227,8 +1343,27 @@
                 <a:ea typeface="+mn-ea"/>
                 <a:cs typeface="+mn-cs"/>
               </a:rPr>
-              <a:t> party services, by having Auth0 generate delegation tokens. For example, when our platform communicates with firebase, it passes a delegation token that is signed by auth0 with our Firebase secret key &amp; proves the users identity to Firebase, which grants them access to protected parts of the database.\</a:t>
+              <a:t> party services, by having Auth0 generate delegation tokens. For example, when our platform communicates with firebase, it passes a delegation token that is signed by auth0 with our Firebase secret key &amp; proves the users identity to Firebase, which grants them access to protected parts of the database</a:t>
             </a:r>
+            <a:r>
+              <a:rPr lang="en-US" sz="1200" u="none" kern="1200" baseline="0" dirty="0" smtClean="0">
+                <a:solidFill>
+                  <a:schemeClr val="tx1"/>
+                </a:solidFill>
+                <a:latin typeface="+mn-lt"/>
+                <a:ea typeface="+mn-ea"/>
+                <a:cs typeface="+mn-cs"/>
+              </a:rPr>
+              <a:t>.</a:t>
+            </a:r>
+            <a:endParaRPr lang="en-US" sz="1200" u="none" kern="1200" baseline="0" dirty="0" smtClean="0">
+              <a:solidFill>
+                <a:schemeClr val="tx1"/>
+              </a:solidFill>
+              <a:latin typeface="+mn-lt"/>
+              <a:ea typeface="+mn-ea"/>
+              <a:cs typeface="+mn-cs"/>
+            </a:endParaRPr>
           </a:p>
           <a:p>
             <a:endParaRPr lang="en-US" dirty="0"/>
@@ -1252,7 +1387,7 @@
           <a:p>
             <a:fld id="{55C38DD1-33AA-4996-977A-42B26A155BBE}" type="slidenum">
               <a:rPr lang="id-ID" smtClean="0"/>
-              <a:t>3</a:t>
+              <a:t>4</a:t>
             </a:fld>
             <a:endParaRPr lang="id-ID"/>
           </a:p>
@@ -1271,7 +1406,99 @@
 </p:notes>
 </file>
 
-<file path=ppt/notesSlides/notesSlide4.xml><?xml version="1.0" encoding="utf-8"?>
+<file path=ppt/notesSlides/notesSlide5.xml><?xml version="1.0" encoding="utf-8"?>
+<p:notes xmlns:a="http://schemas.openxmlformats.org/drawingml/2006/main" xmlns:r="http://schemas.openxmlformats.org/officeDocument/2006/relationships" xmlns:p="http://schemas.openxmlformats.org/presentationml/2006/main">
+  <p:cSld>
+    <p:spTree>
+      <p:nvGrpSpPr>
+        <p:cNvPr id="1" name=""/>
+        <p:cNvGrpSpPr/>
+        <p:nvPr/>
+      </p:nvGrpSpPr>
+      <p:grpSpPr>
+        <a:xfrm>
+          <a:off x="0" y="0"/>
+          <a:ext cx="0" cy="0"/>
+          <a:chOff x="0" y="0"/>
+          <a:chExt cx="0" cy="0"/>
+        </a:xfrm>
+      </p:grpSpPr>
+      <p:sp>
+        <p:nvSpPr>
+          <p:cNvPr id="2" name="Slide Image Placeholder 1"/>
+          <p:cNvSpPr>
+            <a:spLocks noGrp="1" noRot="1" noChangeAspect="1"/>
+          </p:cNvSpPr>
+          <p:nvPr>
+            <p:ph type="sldImg"/>
+          </p:nvPr>
+        </p:nvSpPr>
+        <p:spPr/>
+      </p:sp>
+      <p:sp>
+        <p:nvSpPr>
+          <p:cNvPr id="3" name="Notes Placeholder 2"/>
+          <p:cNvSpPr>
+            <a:spLocks noGrp="1"/>
+          </p:cNvSpPr>
+          <p:nvPr>
+            <p:ph type="body" idx="1"/>
+          </p:nvPr>
+        </p:nvSpPr>
+        <p:spPr/>
+        <p:txBody>
+          <a:bodyPr/>
+          <a:lstStyle/>
+          <a:p>
+            <a:r>
+              <a:rPr lang="en-US" b="1" dirty="0" smtClean="0"/>
+              <a:t>In our workshop</a:t>
+            </a:r>
+            <a:r>
+              <a:rPr lang="en-US" b="1" baseline="0" dirty="0" smtClean="0"/>
+              <a:t> example, we’re </a:t>
+            </a:r>
+            <a:endParaRPr lang="en-US" dirty="0"/>
+          </a:p>
+        </p:txBody>
+      </p:sp>
+      <p:sp>
+        <p:nvSpPr>
+          <p:cNvPr id="4" name="Slide Number Placeholder 3"/>
+          <p:cNvSpPr>
+            <a:spLocks noGrp="1"/>
+          </p:cNvSpPr>
+          <p:nvPr>
+            <p:ph type="sldNum" sz="quarter" idx="10"/>
+          </p:nvPr>
+        </p:nvSpPr>
+        <p:spPr/>
+        <p:txBody>
+          <a:bodyPr/>
+          <a:lstStyle/>
+          <a:p>
+            <a:fld id="{55C38DD1-33AA-4996-977A-42B26A155BBE}" type="slidenum">
+              <a:rPr lang="id-ID" smtClean="0"/>
+              <a:t>5</a:t>
+            </a:fld>
+            <a:endParaRPr lang="id-ID"/>
+          </a:p>
+        </p:txBody>
+      </p:sp>
+    </p:spTree>
+    <p:extLst>
+      <p:ext uri="{BB962C8B-B14F-4D97-AF65-F5344CB8AC3E}">
+        <p14:creationId xmlns:p14="http://schemas.microsoft.com/office/powerpoint/2010/main" val="1746759776"/>
+      </p:ext>
+    </p:extLst>
+  </p:cSld>
+  <p:clrMapOvr>
+    <a:masterClrMapping/>
+  </p:clrMapOvr>
+</p:notes>
+</file>
+
+<file path=ppt/notesSlides/notesSlide6.xml><?xml version="1.0" encoding="utf-8"?>
 <p:notes xmlns:a="http://schemas.openxmlformats.org/drawingml/2006/main" xmlns:r="http://schemas.openxmlformats.org/officeDocument/2006/relationships" xmlns:p="http://schemas.openxmlformats.org/presentationml/2006/main">
   <p:cSld>
     <p:spTree>
@@ -1336,7 +1563,7 @@
           <a:p>
             <a:fld id="{55C38DD1-33AA-4996-977A-42B26A155BBE}" type="slidenum">
               <a:rPr lang="id-ID" smtClean="0"/>
-              <a:t>4</a:t>
+              <a:t>6</a:t>
             </a:fld>
             <a:endParaRPr lang="id-ID"/>
           </a:p>
@@ -1355,7 +1582,7 @@
 </p:notes>
 </file>
 
-<file path=ppt/notesSlides/notesSlide5.xml><?xml version="1.0" encoding="utf-8"?>
+<file path=ppt/notesSlides/notesSlide7.xml><?xml version="1.0" encoding="utf-8"?>
 <p:notes xmlns:a="http://schemas.openxmlformats.org/drawingml/2006/main" xmlns:r="http://schemas.openxmlformats.org/officeDocument/2006/relationships" xmlns:p="http://schemas.openxmlformats.org/presentationml/2006/main">
   <p:cSld>
     <p:spTree>
@@ -1420,7 +1647,7 @@
           <a:p>
             <a:fld id="{55C38DD1-33AA-4996-977A-42B26A155BBE}" type="slidenum">
               <a:rPr lang="id-ID" smtClean="0"/>
-              <a:t>5</a:t>
+              <a:t>7</a:t>
             </a:fld>
             <a:endParaRPr lang="id-ID"/>
           </a:p>
@@ -30872,6 +31099,2459 @@
     <p:bg>
       <p:bgPr>
         <a:solidFill>
+          <a:srgbClr val="222835"/>
+        </a:solidFill>
+        <a:effectLst/>
+      </p:bgPr>
+    </p:bg>
+    <p:spTree>
+      <p:nvGrpSpPr>
+        <p:cNvPr id="1" name=""/>
+        <p:cNvGrpSpPr/>
+        <p:nvPr/>
+      </p:nvGrpSpPr>
+      <p:grpSpPr>
+        <a:xfrm>
+          <a:off x="0" y="0"/>
+          <a:ext cx="0" cy="0"/>
+          <a:chOff x="0" y="0"/>
+          <a:chExt cx="0" cy="0"/>
+        </a:xfrm>
+      </p:grpSpPr>
+      <p:grpSp>
+        <p:nvGrpSpPr>
+          <p:cNvPr id="18" name="Group 17"/>
+          <p:cNvGrpSpPr/>
+          <p:nvPr/>
+        </p:nvGrpSpPr>
+        <p:grpSpPr>
+          <a:xfrm>
+            <a:off x="2" y="6736617"/>
+            <a:ext cx="12191999" cy="134339"/>
+            <a:chOff x="2" y="2110197"/>
+            <a:chExt cx="12191999" cy="134339"/>
+          </a:xfrm>
+        </p:grpSpPr>
+        <p:sp>
+          <p:nvSpPr>
+            <p:cNvPr id="19" name="Rectangle 18"/>
+            <p:cNvSpPr/>
+            <p:nvPr/>
+          </p:nvSpPr>
+          <p:spPr>
+            <a:xfrm rot="16200000">
+              <a:off x="2980836" y="1161370"/>
+              <a:ext cx="134333" cy="2032000"/>
+            </a:xfrm>
+            <a:prstGeom prst="rect">
+              <a:avLst/>
+            </a:prstGeom>
+            <a:solidFill>
+              <a:schemeClr val="accent1">
+                <a:lumMod val="75000"/>
+              </a:schemeClr>
+            </a:solidFill>
+            <a:ln>
+              <a:noFill/>
+            </a:ln>
+          </p:spPr>
+          <p:style>
+            <a:lnRef idx="2">
+              <a:schemeClr val="accent1">
+                <a:shade val="50000"/>
+              </a:schemeClr>
+            </a:lnRef>
+            <a:fillRef idx="1">
+              <a:schemeClr val="accent1"/>
+            </a:fillRef>
+            <a:effectRef idx="0">
+              <a:schemeClr val="accent1"/>
+            </a:effectRef>
+            <a:fontRef idx="minor">
+              <a:schemeClr val="lt1"/>
+            </a:fontRef>
+          </p:style>
+          <p:txBody>
+            <a:bodyPr rtlCol="0" anchor="ctr"/>
+            <a:lstStyle/>
+            <a:p>
+              <a:pPr algn="ctr"/>
+              <a:endParaRPr lang="id-ID"/>
+            </a:p>
+          </p:txBody>
+        </p:sp>
+        <p:sp>
+          <p:nvSpPr>
+            <p:cNvPr id="20" name="Rectangle 19"/>
+            <p:cNvSpPr/>
+            <p:nvPr/>
+          </p:nvSpPr>
+          <p:spPr>
+            <a:xfrm rot="16200000">
+              <a:off x="5012835" y="1161369"/>
+              <a:ext cx="134333" cy="2032000"/>
+            </a:xfrm>
+            <a:prstGeom prst="rect">
+              <a:avLst/>
+            </a:prstGeom>
+            <a:solidFill>
+              <a:schemeClr val="accent2">
+                <a:lumMod val="75000"/>
+              </a:schemeClr>
+            </a:solidFill>
+            <a:ln>
+              <a:noFill/>
+            </a:ln>
+          </p:spPr>
+          <p:style>
+            <a:lnRef idx="2">
+              <a:schemeClr val="accent1">
+                <a:shade val="50000"/>
+              </a:schemeClr>
+            </a:lnRef>
+            <a:fillRef idx="1">
+              <a:schemeClr val="accent1"/>
+            </a:fillRef>
+            <a:effectRef idx="0">
+              <a:schemeClr val="accent1"/>
+            </a:effectRef>
+            <a:fontRef idx="minor">
+              <a:schemeClr val="lt1"/>
+            </a:fontRef>
+          </p:style>
+          <p:txBody>
+            <a:bodyPr rtlCol="0" anchor="ctr"/>
+            <a:lstStyle/>
+            <a:p>
+              <a:pPr algn="ctr"/>
+              <a:endParaRPr lang="id-ID"/>
+            </a:p>
+          </p:txBody>
+        </p:sp>
+        <p:sp>
+          <p:nvSpPr>
+            <p:cNvPr id="21" name="Rectangle 20"/>
+            <p:cNvSpPr/>
+            <p:nvPr/>
+          </p:nvSpPr>
+          <p:spPr>
+            <a:xfrm rot="16200000">
+              <a:off x="7044834" y="1161369"/>
+              <a:ext cx="134335" cy="2032000"/>
+            </a:xfrm>
+            <a:prstGeom prst="rect">
+              <a:avLst/>
+            </a:prstGeom>
+            <a:solidFill>
+              <a:schemeClr val="accent3">
+                <a:lumMod val="75000"/>
+              </a:schemeClr>
+            </a:solidFill>
+            <a:ln>
+              <a:noFill/>
+            </a:ln>
+          </p:spPr>
+          <p:style>
+            <a:lnRef idx="2">
+              <a:schemeClr val="accent1">
+                <a:shade val="50000"/>
+              </a:schemeClr>
+            </a:lnRef>
+            <a:fillRef idx="1">
+              <a:schemeClr val="accent1"/>
+            </a:fillRef>
+            <a:effectRef idx="0">
+              <a:schemeClr val="accent1"/>
+            </a:effectRef>
+            <a:fontRef idx="minor">
+              <a:schemeClr val="lt1"/>
+            </a:fontRef>
+          </p:style>
+          <p:txBody>
+            <a:bodyPr rtlCol="0" anchor="ctr"/>
+            <a:lstStyle/>
+            <a:p>
+              <a:pPr algn="ctr"/>
+              <a:endParaRPr lang="id-ID"/>
+            </a:p>
+          </p:txBody>
+        </p:sp>
+        <p:sp>
+          <p:nvSpPr>
+            <p:cNvPr id="22" name="Rectangle 21"/>
+            <p:cNvSpPr/>
+            <p:nvPr/>
+          </p:nvSpPr>
+          <p:spPr>
+            <a:xfrm rot="16200000">
+              <a:off x="9076834" y="1161367"/>
+              <a:ext cx="134336" cy="2032000"/>
+            </a:xfrm>
+            <a:prstGeom prst="rect">
+              <a:avLst/>
+            </a:prstGeom>
+            <a:solidFill>
+              <a:schemeClr val="accent4">
+                <a:lumMod val="75000"/>
+              </a:schemeClr>
+            </a:solidFill>
+            <a:ln>
+              <a:noFill/>
+            </a:ln>
+          </p:spPr>
+          <p:style>
+            <a:lnRef idx="2">
+              <a:schemeClr val="accent1">
+                <a:shade val="50000"/>
+              </a:schemeClr>
+            </a:lnRef>
+            <a:fillRef idx="1">
+              <a:schemeClr val="accent1"/>
+            </a:fillRef>
+            <a:effectRef idx="0">
+              <a:schemeClr val="accent1"/>
+            </a:effectRef>
+            <a:fontRef idx="minor">
+              <a:schemeClr val="lt1"/>
+            </a:fontRef>
+          </p:style>
+          <p:txBody>
+            <a:bodyPr rtlCol="0" anchor="ctr"/>
+            <a:lstStyle/>
+            <a:p>
+              <a:pPr algn="ctr"/>
+              <a:endParaRPr lang="id-ID"/>
+            </a:p>
+          </p:txBody>
+        </p:sp>
+        <p:sp>
+          <p:nvSpPr>
+            <p:cNvPr id="23" name="Rectangle 22"/>
+            <p:cNvSpPr/>
+            <p:nvPr/>
+          </p:nvSpPr>
+          <p:spPr>
+            <a:xfrm rot="16200000">
+              <a:off x="11108832" y="1161366"/>
+              <a:ext cx="134338" cy="2032000"/>
+            </a:xfrm>
+            <a:prstGeom prst="rect">
+              <a:avLst/>
+            </a:prstGeom>
+            <a:solidFill>
+              <a:schemeClr val="accent5">
+                <a:lumMod val="75000"/>
+              </a:schemeClr>
+            </a:solidFill>
+            <a:ln>
+              <a:noFill/>
+            </a:ln>
+          </p:spPr>
+          <p:style>
+            <a:lnRef idx="2">
+              <a:schemeClr val="accent1">
+                <a:shade val="50000"/>
+              </a:schemeClr>
+            </a:lnRef>
+            <a:fillRef idx="1">
+              <a:schemeClr val="accent1"/>
+            </a:fillRef>
+            <a:effectRef idx="0">
+              <a:schemeClr val="accent1"/>
+            </a:effectRef>
+            <a:fontRef idx="minor">
+              <a:schemeClr val="lt1"/>
+            </a:fontRef>
+          </p:style>
+          <p:txBody>
+            <a:bodyPr rtlCol="0" anchor="ctr"/>
+            <a:lstStyle/>
+            <a:p>
+              <a:pPr algn="ctr"/>
+              <a:endParaRPr lang="id-ID"/>
+            </a:p>
+          </p:txBody>
+        </p:sp>
+        <p:sp>
+          <p:nvSpPr>
+            <p:cNvPr id="24" name="Rectangle 23"/>
+            <p:cNvSpPr/>
+            <p:nvPr/>
+          </p:nvSpPr>
+          <p:spPr>
+            <a:xfrm rot="16200000">
+              <a:off x="948836" y="1161370"/>
+              <a:ext cx="134331" cy="2032000"/>
+            </a:xfrm>
+            <a:prstGeom prst="rect">
+              <a:avLst/>
+            </a:prstGeom>
+            <a:solidFill>
+              <a:schemeClr val="accent6">
+                <a:lumMod val="75000"/>
+              </a:schemeClr>
+            </a:solidFill>
+            <a:ln>
+              <a:noFill/>
+            </a:ln>
+          </p:spPr>
+          <p:style>
+            <a:lnRef idx="2">
+              <a:schemeClr val="accent1">
+                <a:shade val="50000"/>
+              </a:schemeClr>
+            </a:lnRef>
+            <a:fillRef idx="1">
+              <a:schemeClr val="accent1"/>
+            </a:fillRef>
+            <a:effectRef idx="0">
+              <a:schemeClr val="accent1"/>
+            </a:effectRef>
+            <a:fontRef idx="minor">
+              <a:schemeClr val="lt1"/>
+            </a:fontRef>
+          </p:style>
+          <p:txBody>
+            <a:bodyPr rtlCol="0" anchor="ctr"/>
+            <a:lstStyle/>
+            <a:p>
+              <a:pPr algn="ctr"/>
+              <a:endParaRPr lang="id-ID"/>
+            </a:p>
+          </p:txBody>
+        </p:sp>
+      </p:grpSp>
+      <p:grpSp>
+        <p:nvGrpSpPr>
+          <p:cNvPr id="82" name="Group 81"/>
+          <p:cNvGrpSpPr/>
+          <p:nvPr/>
+        </p:nvGrpSpPr>
+        <p:grpSpPr>
+          <a:xfrm>
+            <a:off x="5315293" y="2924389"/>
+            <a:ext cx="1384981" cy="1098964"/>
+            <a:chOff x="5499100" y="144463"/>
+            <a:chExt cx="3213100" cy="2614612"/>
+          </a:xfrm>
+          <a:effectLst>
+            <a:outerShdw blurRad="127000" dir="13500000" sy="23000" kx="1200000" algn="br" rotWithShape="0">
+              <a:prstClr val="black">
+                <a:alpha val="10000"/>
+              </a:prstClr>
+            </a:outerShdw>
+          </a:effectLst>
+        </p:grpSpPr>
+        <p:sp>
+          <p:nvSpPr>
+            <p:cNvPr id="83" name="Freeform 28"/>
+            <p:cNvSpPr>
+              <a:spLocks/>
+            </p:cNvSpPr>
+            <p:nvPr/>
+          </p:nvSpPr>
+          <p:spPr bwMode="auto">
+            <a:xfrm>
+              <a:off x="5499100" y="144463"/>
+              <a:ext cx="3213100" cy="1944687"/>
+            </a:xfrm>
+            <a:custGeom>
+              <a:avLst/>
+              <a:gdLst>
+                <a:gd name="T0" fmla="*/ 0 w 854"/>
+                <a:gd name="T1" fmla="*/ 516 h 516"/>
+                <a:gd name="T2" fmla="*/ 0 w 854"/>
+                <a:gd name="T3" fmla="*/ 19 h 516"/>
+                <a:gd name="T4" fmla="*/ 20 w 854"/>
+                <a:gd name="T5" fmla="*/ 0 h 516"/>
+                <a:gd name="T6" fmla="*/ 835 w 854"/>
+                <a:gd name="T7" fmla="*/ 0 h 516"/>
+                <a:gd name="T8" fmla="*/ 854 w 854"/>
+                <a:gd name="T9" fmla="*/ 19 h 516"/>
+                <a:gd name="T10" fmla="*/ 854 w 854"/>
+                <a:gd name="T11" fmla="*/ 516 h 516"/>
+                <a:gd name="T12" fmla="*/ 0 w 854"/>
+                <a:gd name="T13" fmla="*/ 516 h 516"/>
+              </a:gdLst>
+              <a:ahLst/>
+              <a:cxnLst>
+                <a:cxn ang="0">
+                  <a:pos x="T0" y="T1"/>
+                </a:cxn>
+                <a:cxn ang="0">
+                  <a:pos x="T2" y="T3"/>
+                </a:cxn>
+                <a:cxn ang="0">
+                  <a:pos x="T4" y="T5"/>
+                </a:cxn>
+                <a:cxn ang="0">
+                  <a:pos x="T6" y="T7"/>
+                </a:cxn>
+                <a:cxn ang="0">
+                  <a:pos x="T8" y="T9"/>
+                </a:cxn>
+                <a:cxn ang="0">
+                  <a:pos x="T10" y="T11"/>
+                </a:cxn>
+                <a:cxn ang="0">
+                  <a:pos x="T12" y="T13"/>
+                </a:cxn>
+              </a:cxnLst>
+              <a:rect l="0" t="0" r="r" b="b"/>
+              <a:pathLst>
+                <a:path w="854" h="516">
+                  <a:moveTo>
+                    <a:pt x="0" y="516"/>
+                  </a:moveTo>
+                  <a:cubicBezTo>
+                    <a:pt x="0" y="19"/>
+                    <a:pt x="0" y="19"/>
+                    <a:pt x="0" y="19"/>
+                  </a:cubicBezTo>
+                  <a:cubicBezTo>
+                    <a:pt x="0" y="8"/>
+                    <a:pt x="9" y="0"/>
+                    <a:pt x="20" y="0"/>
+                  </a:cubicBezTo>
+                  <a:cubicBezTo>
+                    <a:pt x="835" y="0"/>
+                    <a:pt x="835" y="0"/>
+                    <a:pt x="835" y="0"/>
+                  </a:cubicBezTo>
+                  <a:cubicBezTo>
+                    <a:pt x="845" y="0"/>
+                    <a:pt x="854" y="8"/>
+                    <a:pt x="854" y="19"/>
+                  </a:cubicBezTo>
+                  <a:cubicBezTo>
+                    <a:pt x="854" y="516"/>
+                    <a:pt x="854" y="516"/>
+                    <a:pt x="854" y="516"/>
+                  </a:cubicBezTo>
+                  <a:lnTo>
+                    <a:pt x="0" y="516"/>
+                  </a:lnTo>
+                  <a:close/>
+                </a:path>
+              </a:pathLst>
+            </a:custGeom>
+            <a:solidFill>
+              <a:schemeClr val="bg1">
+                <a:lumMod val="85000"/>
+              </a:schemeClr>
+            </a:solidFill>
+            <a:ln>
+              <a:noFill/>
+            </a:ln>
+            <a:extLst>
+              <a:ext uri="{91240B29-F687-4f45-9708-019B960494DF}">
+                <a14:hiddenLine xmlns:a14="http://schemas.microsoft.com/office/drawing/2010/main" xmlns="" w="9525">
+                  <a:solidFill>
+                    <a:srgbClr val="000000"/>
+                  </a:solidFill>
+                  <a:round/>
+                  <a:headEnd/>
+                  <a:tailEnd/>
+                </a14:hiddenLine>
+              </a:ext>
+            </a:extLst>
+          </p:spPr>
+          <p:txBody>
+            <a:bodyPr vert="horz" wrap="square" lIns="91440" tIns="45720" rIns="91440" bIns="45720" numCol="1" anchor="t" anchorCtr="0" compatLnSpc="1">
+              <a:prstTxWarp prst="textNoShape">
+                <a:avLst/>
+              </a:prstTxWarp>
+            </a:bodyPr>
+            <a:lstStyle/>
+            <a:p>
+              <a:endParaRPr lang="id-ID"/>
+            </a:p>
+          </p:txBody>
+        </p:sp>
+        <p:sp>
+          <p:nvSpPr>
+            <p:cNvPr id="84" name="Freeform 29"/>
+            <p:cNvSpPr>
+              <a:spLocks/>
+            </p:cNvSpPr>
+            <p:nvPr/>
+          </p:nvSpPr>
+          <p:spPr bwMode="auto">
+            <a:xfrm>
+              <a:off x="5499100" y="2089150"/>
+              <a:ext cx="3213100" cy="290512"/>
+            </a:xfrm>
+            <a:custGeom>
+              <a:avLst/>
+              <a:gdLst>
+                <a:gd name="T0" fmla="*/ 835 w 854"/>
+                <a:gd name="T1" fmla="*/ 77 h 77"/>
+                <a:gd name="T2" fmla="*/ 20 w 854"/>
+                <a:gd name="T3" fmla="*/ 77 h 77"/>
+                <a:gd name="T4" fmla="*/ 0 w 854"/>
+                <a:gd name="T5" fmla="*/ 58 h 77"/>
+                <a:gd name="T6" fmla="*/ 0 w 854"/>
+                <a:gd name="T7" fmla="*/ 0 h 77"/>
+                <a:gd name="T8" fmla="*/ 854 w 854"/>
+                <a:gd name="T9" fmla="*/ 0 h 77"/>
+                <a:gd name="T10" fmla="*/ 854 w 854"/>
+                <a:gd name="T11" fmla="*/ 58 h 77"/>
+                <a:gd name="T12" fmla="*/ 835 w 854"/>
+                <a:gd name="T13" fmla="*/ 77 h 77"/>
+              </a:gdLst>
+              <a:ahLst/>
+              <a:cxnLst>
+                <a:cxn ang="0">
+                  <a:pos x="T0" y="T1"/>
+                </a:cxn>
+                <a:cxn ang="0">
+                  <a:pos x="T2" y="T3"/>
+                </a:cxn>
+                <a:cxn ang="0">
+                  <a:pos x="T4" y="T5"/>
+                </a:cxn>
+                <a:cxn ang="0">
+                  <a:pos x="T6" y="T7"/>
+                </a:cxn>
+                <a:cxn ang="0">
+                  <a:pos x="T8" y="T9"/>
+                </a:cxn>
+                <a:cxn ang="0">
+                  <a:pos x="T10" y="T11"/>
+                </a:cxn>
+                <a:cxn ang="0">
+                  <a:pos x="T12" y="T13"/>
+                </a:cxn>
+              </a:cxnLst>
+              <a:rect l="0" t="0" r="r" b="b"/>
+              <a:pathLst>
+                <a:path w="854" h="77">
+                  <a:moveTo>
+                    <a:pt x="835" y="77"/>
+                  </a:moveTo>
+                  <a:cubicBezTo>
+                    <a:pt x="20" y="77"/>
+                    <a:pt x="20" y="77"/>
+                    <a:pt x="20" y="77"/>
+                  </a:cubicBezTo>
+                  <a:cubicBezTo>
+                    <a:pt x="9" y="77"/>
+                    <a:pt x="0" y="69"/>
+                    <a:pt x="0" y="58"/>
+                  </a:cubicBezTo>
+                  <a:cubicBezTo>
+                    <a:pt x="0" y="0"/>
+                    <a:pt x="0" y="0"/>
+                    <a:pt x="0" y="0"/>
+                  </a:cubicBezTo>
+                  <a:cubicBezTo>
+                    <a:pt x="854" y="0"/>
+                    <a:pt x="854" y="0"/>
+                    <a:pt x="854" y="0"/>
+                  </a:cubicBezTo>
+                  <a:cubicBezTo>
+                    <a:pt x="854" y="58"/>
+                    <a:pt x="854" y="58"/>
+                    <a:pt x="854" y="58"/>
+                  </a:cubicBezTo>
+                  <a:cubicBezTo>
+                    <a:pt x="854" y="69"/>
+                    <a:pt x="845" y="77"/>
+                    <a:pt x="835" y="77"/>
+                  </a:cubicBezTo>
+                </a:path>
+              </a:pathLst>
+            </a:custGeom>
+            <a:solidFill>
+              <a:schemeClr val="bg1">
+                <a:lumMod val="95000"/>
+              </a:schemeClr>
+            </a:solidFill>
+            <a:ln>
+              <a:noFill/>
+            </a:ln>
+          </p:spPr>
+          <p:txBody>
+            <a:bodyPr vert="horz" wrap="square" lIns="91440" tIns="45720" rIns="91440" bIns="45720" numCol="1" anchor="t" anchorCtr="0" compatLnSpc="1">
+              <a:prstTxWarp prst="textNoShape">
+                <a:avLst/>
+              </a:prstTxWarp>
+            </a:bodyPr>
+            <a:lstStyle/>
+            <a:p>
+              <a:endParaRPr lang="id-ID"/>
+            </a:p>
+          </p:txBody>
+        </p:sp>
+        <p:sp>
+          <p:nvSpPr>
+            <p:cNvPr id="85" name="Freeform 30"/>
+            <p:cNvSpPr>
+              <a:spLocks/>
+            </p:cNvSpPr>
+            <p:nvPr/>
+          </p:nvSpPr>
+          <p:spPr bwMode="auto">
+            <a:xfrm>
+              <a:off x="6594475" y="2371725"/>
+              <a:ext cx="1076325" cy="387350"/>
+            </a:xfrm>
+            <a:custGeom>
+              <a:avLst/>
+              <a:gdLst>
+                <a:gd name="T0" fmla="*/ 0 w 678"/>
+                <a:gd name="T1" fmla="*/ 244 h 244"/>
+                <a:gd name="T2" fmla="*/ 0 w 678"/>
+                <a:gd name="T3" fmla="*/ 218 h 244"/>
+                <a:gd name="T4" fmla="*/ 80 w 678"/>
+                <a:gd name="T5" fmla="*/ 209 h 244"/>
+                <a:gd name="T6" fmla="*/ 135 w 678"/>
+                <a:gd name="T7" fmla="*/ 0 h 244"/>
+                <a:gd name="T8" fmla="*/ 543 w 678"/>
+                <a:gd name="T9" fmla="*/ 0 h 244"/>
+                <a:gd name="T10" fmla="*/ 599 w 678"/>
+                <a:gd name="T11" fmla="*/ 209 h 244"/>
+                <a:gd name="T12" fmla="*/ 678 w 678"/>
+                <a:gd name="T13" fmla="*/ 218 h 244"/>
+                <a:gd name="T14" fmla="*/ 678 w 678"/>
+                <a:gd name="T15" fmla="*/ 244 h 244"/>
+                <a:gd name="T16" fmla="*/ 0 w 678"/>
+                <a:gd name="T17" fmla="*/ 244 h 244"/>
+              </a:gdLst>
+              <a:ahLst/>
+              <a:cxnLst>
+                <a:cxn ang="0">
+                  <a:pos x="T0" y="T1"/>
+                </a:cxn>
+                <a:cxn ang="0">
+                  <a:pos x="T2" y="T3"/>
+                </a:cxn>
+                <a:cxn ang="0">
+                  <a:pos x="T4" y="T5"/>
+                </a:cxn>
+                <a:cxn ang="0">
+                  <a:pos x="T6" y="T7"/>
+                </a:cxn>
+                <a:cxn ang="0">
+                  <a:pos x="T8" y="T9"/>
+                </a:cxn>
+                <a:cxn ang="0">
+                  <a:pos x="T10" y="T11"/>
+                </a:cxn>
+                <a:cxn ang="0">
+                  <a:pos x="T12" y="T13"/>
+                </a:cxn>
+                <a:cxn ang="0">
+                  <a:pos x="T14" y="T15"/>
+                </a:cxn>
+                <a:cxn ang="0">
+                  <a:pos x="T16" y="T17"/>
+                </a:cxn>
+              </a:cxnLst>
+              <a:rect l="0" t="0" r="r" b="b"/>
+              <a:pathLst>
+                <a:path w="678" h="244">
+                  <a:moveTo>
+                    <a:pt x="0" y="244"/>
+                  </a:moveTo>
+                  <a:lnTo>
+                    <a:pt x="0" y="218"/>
+                  </a:lnTo>
+                  <a:lnTo>
+                    <a:pt x="80" y="209"/>
+                  </a:lnTo>
+                  <a:lnTo>
+                    <a:pt x="135" y="0"/>
+                  </a:lnTo>
+                  <a:lnTo>
+                    <a:pt x="543" y="0"/>
+                  </a:lnTo>
+                  <a:lnTo>
+                    <a:pt x="599" y="209"/>
+                  </a:lnTo>
+                  <a:lnTo>
+                    <a:pt x="678" y="218"/>
+                  </a:lnTo>
+                  <a:lnTo>
+                    <a:pt x="678" y="244"/>
+                  </a:lnTo>
+                  <a:lnTo>
+                    <a:pt x="0" y="244"/>
+                  </a:lnTo>
+                  <a:close/>
+                </a:path>
+              </a:pathLst>
+            </a:custGeom>
+            <a:solidFill>
+              <a:schemeClr val="bg1">
+                <a:lumMod val="95000"/>
+              </a:schemeClr>
+            </a:solidFill>
+            <a:ln>
+              <a:noFill/>
+            </a:ln>
+          </p:spPr>
+          <p:txBody>
+            <a:bodyPr vert="horz" wrap="square" lIns="91440" tIns="45720" rIns="91440" bIns="45720" numCol="1" anchor="t" anchorCtr="0" compatLnSpc="1">
+              <a:prstTxWarp prst="textNoShape">
+                <a:avLst/>
+              </a:prstTxWarp>
+            </a:bodyPr>
+            <a:lstStyle/>
+            <a:p>
+              <a:endParaRPr lang="id-ID"/>
+            </a:p>
+          </p:txBody>
+        </p:sp>
+        <p:sp>
+          <p:nvSpPr>
+            <p:cNvPr id="86" name="Freeform 31"/>
+            <p:cNvSpPr>
+              <a:spLocks/>
+            </p:cNvSpPr>
+            <p:nvPr/>
+          </p:nvSpPr>
+          <p:spPr bwMode="auto">
+            <a:xfrm>
+              <a:off x="6594475" y="2371725"/>
+              <a:ext cx="1076325" cy="387350"/>
+            </a:xfrm>
+            <a:custGeom>
+              <a:avLst/>
+              <a:gdLst>
+                <a:gd name="T0" fmla="*/ 0 w 678"/>
+                <a:gd name="T1" fmla="*/ 244 h 244"/>
+                <a:gd name="T2" fmla="*/ 0 w 678"/>
+                <a:gd name="T3" fmla="*/ 218 h 244"/>
+                <a:gd name="T4" fmla="*/ 80 w 678"/>
+                <a:gd name="T5" fmla="*/ 209 h 244"/>
+                <a:gd name="T6" fmla="*/ 135 w 678"/>
+                <a:gd name="T7" fmla="*/ 0 h 244"/>
+                <a:gd name="T8" fmla="*/ 543 w 678"/>
+                <a:gd name="T9" fmla="*/ 0 h 244"/>
+                <a:gd name="T10" fmla="*/ 599 w 678"/>
+                <a:gd name="T11" fmla="*/ 209 h 244"/>
+                <a:gd name="T12" fmla="*/ 678 w 678"/>
+                <a:gd name="T13" fmla="*/ 218 h 244"/>
+                <a:gd name="T14" fmla="*/ 678 w 678"/>
+                <a:gd name="T15" fmla="*/ 244 h 244"/>
+                <a:gd name="T16" fmla="*/ 0 w 678"/>
+                <a:gd name="T17" fmla="*/ 244 h 244"/>
+              </a:gdLst>
+              <a:ahLst/>
+              <a:cxnLst>
+                <a:cxn ang="0">
+                  <a:pos x="T0" y="T1"/>
+                </a:cxn>
+                <a:cxn ang="0">
+                  <a:pos x="T2" y="T3"/>
+                </a:cxn>
+                <a:cxn ang="0">
+                  <a:pos x="T4" y="T5"/>
+                </a:cxn>
+                <a:cxn ang="0">
+                  <a:pos x="T6" y="T7"/>
+                </a:cxn>
+                <a:cxn ang="0">
+                  <a:pos x="T8" y="T9"/>
+                </a:cxn>
+                <a:cxn ang="0">
+                  <a:pos x="T10" y="T11"/>
+                </a:cxn>
+                <a:cxn ang="0">
+                  <a:pos x="T12" y="T13"/>
+                </a:cxn>
+                <a:cxn ang="0">
+                  <a:pos x="T14" y="T15"/>
+                </a:cxn>
+                <a:cxn ang="0">
+                  <a:pos x="T16" y="T17"/>
+                </a:cxn>
+              </a:cxnLst>
+              <a:rect l="0" t="0" r="r" b="b"/>
+              <a:pathLst>
+                <a:path w="678" h="244">
+                  <a:moveTo>
+                    <a:pt x="0" y="244"/>
+                  </a:moveTo>
+                  <a:lnTo>
+                    <a:pt x="0" y="218"/>
+                  </a:lnTo>
+                  <a:lnTo>
+                    <a:pt x="80" y="209"/>
+                  </a:lnTo>
+                  <a:lnTo>
+                    <a:pt x="135" y="0"/>
+                  </a:lnTo>
+                  <a:lnTo>
+                    <a:pt x="543" y="0"/>
+                  </a:lnTo>
+                  <a:lnTo>
+                    <a:pt x="599" y="209"/>
+                  </a:lnTo>
+                  <a:lnTo>
+                    <a:pt x="678" y="218"/>
+                  </a:lnTo>
+                  <a:lnTo>
+                    <a:pt x="678" y="244"/>
+                  </a:lnTo>
+                  <a:lnTo>
+                    <a:pt x="0" y="244"/>
+                  </a:lnTo>
+                </a:path>
+              </a:pathLst>
+            </a:custGeom>
+            <a:noFill/>
+            <a:ln>
+              <a:noFill/>
+            </a:ln>
+            <a:extLst>
+              <a:ext uri="{909E8E84-426E-40dd-AFC4-6F175D3DCCD1}">
+                <a14:hiddenFill xmlns:a14="http://schemas.microsoft.com/office/drawing/2010/main" xmlns="">
+                  <a:solidFill>
+                    <a:srgbClr val="FFFFFF"/>
+                  </a:solidFill>
+                </a14:hiddenFill>
+              </a:ext>
+              <a:ext uri="{91240B29-F687-4f45-9708-019B960494DF}">
+                <a14:hiddenLine xmlns:a14="http://schemas.microsoft.com/office/drawing/2010/main" xmlns="" w="9525">
+                  <a:solidFill>
+                    <a:srgbClr val="000000"/>
+                  </a:solidFill>
+                  <a:round/>
+                  <a:headEnd/>
+                  <a:tailEnd/>
+                </a14:hiddenLine>
+              </a:ext>
+            </a:extLst>
+          </p:spPr>
+          <p:txBody>
+            <a:bodyPr vert="horz" wrap="square" lIns="91440" tIns="45720" rIns="91440" bIns="45720" numCol="1" anchor="t" anchorCtr="0" compatLnSpc="1">
+              <a:prstTxWarp prst="textNoShape">
+                <a:avLst/>
+              </a:prstTxWarp>
+            </a:bodyPr>
+            <a:lstStyle/>
+            <a:p>
+              <a:endParaRPr lang="id-ID"/>
+            </a:p>
+          </p:txBody>
+        </p:sp>
+        <p:sp>
+          <p:nvSpPr>
+            <p:cNvPr id="87" name="Rectangle 32"/>
+            <p:cNvSpPr>
+              <a:spLocks noChangeArrowheads="1"/>
+            </p:cNvSpPr>
+            <p:nvPr/>
+          </p:nvSpPr>
+          <p:spPr bwMode="auto">
+            <a:xfrm>
+              <a:off x="5600700" y="268288"/>
+              <a:ext cx="3009900" cy="1695450"/>
+            </a:xfrm>
+            <a:prstGeom prst="rect">
+              <a:avLst/>
+            </a:prstGeom>
+            <a:solidFill>
+              <a:schemeClr val="accent6"/>
+            </a:solidFill>
+            <a:ln>
+              <a:noFill/>
+            </a:ln>
+            <a:extLst>
+              <a:ext uri="{91240B29-F687-4f45-9708-019B960494DF}">
+                <a14:hiddenLine xmlns:a14="http://schemas.microsoft.com/office/drawing/2010/main" xmlns="" w="9525">
+                  <a:solidFill>
+                    <a:srgbClr val="000000"/>
+                  </a:solidFill>
+                  <a:miter lim="800000"/>
+                  <a:headEnd/>
+                  <a:tailEnd/>
+                </a14:hiddenLine>
+              </a:ext>
+            </a:extLst>
+          </p:spPr>
+          <p:txBody>
+            <a:bodyPr vert="horz" wrap="square" lIns="91440" tIns="45720" rIns="91440" bIns="45720" numCol="1" anchor="t" anchorCtr="0" compatLnSpc="1">
+              <a:prstTxWarp prst="textNoShape">
+                <a:avLst/>
+              </a:prstTxWarp>
+            </a:bodyPr>
+            <a:lstStyle/>
+            <a:p>
+              <a:endParaRPr lang="id-ID"/>
+            </a:p>
+          </p:txBody>
+        </p:sp>
+        <p:sp>
+          <p:nvSpPr>
+            <p:cNvPr id="88" name="Freeform 33"/>
+            <p:cNvSpPr>
+              <a:spLocks/>
+            </p:cNvSpPr>
+            <p:nvPr/>
+          </p:nvSpPr>
+          <p:spPr bwMode="auto">
+            <a:xfrm>
+              <a:off x="6797675" y="2371725"/>
+              <a:ext cx="673100" cy="60325"/>
+            </a:xfrm>
+            <a:custGeom>
+              <a:avLst/>
+              <a:gdLst>
+                <a:gd name="T0" fmla="*/ 415 w 424"/>
+                <a:gd name="T1" fmla="*/ 0 h 38"/>
+                <a:gd name="T2" fmla="*/ 7 w 424"/>
+                <a:gd name="T3" fmla="*/ 0 h 38"/>
+                <a:gd name="T4" fmla="*/ 0 w 424"/>
+                <a:gd name="T5" fmla="*/ 38 h 38"/>
+                <a:gd name="T6" fmla="*/ 424 w 424"/>
+                <a:gd name="T7" fmla="*/ 38 h 38"/>
+                <a:gd name="T8" fmla="*/ 415 w 424"/>
+                <a:gd name="T9" fmla="*/ 0 h 38"/>
+              </a:gdLst>
+              <a:ahLst/>
+              <a:cxnLst>
+                <a:cxn ang="0">
+                  <a:pos x="T0" y="T1"/>
+                </a:cxn>
+                <a:cxn ang="0">
+                  <a:pos x="T2" y="T3"/>
+                </a:cxn>
+                <a:cxn ang="0">
+                  <a:pos x="T4" y="T5"/>
+                </a:cxn>
+                <a:cxn ang="0">
+                  <a:pos x="T6" y="T7"/>
+                </a:cxn>
+                <a:cxn ang="0">
+                  <a:pos x="T8" y="T9"/>
+                </a:cxn>
+              </a:cxnLst>
+              <a:rect l="0" t="0" r="r" b="b"/>
+              <a:pathLst>
+                <a:path w="424" h="38">
+                  <a:moveTo>
+                    <a:pt x="415" y="0"/>
+                  </a:moveTo>
+                  <a:lnTo>
+                    <a:pt x="7" y="0"/>
+                  </a:lnTo>
+                  <a:lnTo>
+                    <a:pt x="0" y="38"/>
+                  </a:lnTo>
+                  <a:lnTo>
+                    <a:pt x="424" y="38"/>
+                  </a:lnTo>
+                  <a:lnTo>
+                    <a:pt x="415" y="0"/>
+                  </a:lnTo>
+                  <a:close/>
+                </a:path>
+              </a:pathLst>
+            </a:custGeom>
+            <a:solidFill>
+              <a:schemeClr val="tx1">
+                <a:alpha val="5000"/>
+              </a:schemeClr>
+            </a:solidFill>
+            <a:ln>
+              <a:noFill/>
+            </a:ln>
+          </p:spPr>
+          <p:txBody>
+            <a:bodyPr vert="horz" wrap="square" lIns="91440" tIns="45720" rIns="91440" bIns="45720" numCol="1" anchor="t" anchorCtr="0" compatLnSpc="1">
+              <a:prstTxWarp prst="textNoShape">
+                <a:avLst/>
+              </a:prstTxWarp>
+            </a:bodyPr>
+            <a:lstStyle/>
+            <a:p>
+              <a:endParaRPr lang="id-ID"/>
+            </a:p>
+          </p:txBody>
+        </p:sp>
+        <p:sp>
+          <p:nvSpPr>
+            <p:cNvPr id="89" name="Freeform 34"/>
+            <p:cNvSpPr>
+              <a:spLocks/>
+            </p:cNvSpPr>
+            <p:nvPr/>
+          </p:nvSpPr>
+          <p:spPr bwMode="auto">
+            <a:xfrm>
+              <a:off x="6797675" y="2371725"/>
+              <a:ext cx="673100" cy="60325"/>
+            </a:xfrm>
+            <a:custGeom>
+              <a:avLst/>
+              <a:gdLst>
+                <a:gd name="T0" fmla="*/ 415 w 424"/>
+                <a:gd name="T1" fmla="*/ 0 h 38"/>
+                <a:gd name="T2" fmla="*/ 7 w 424"/>
+                <a:gd name="T3" fmla="*/ 0 h 38"/>
+                <a:gd name="T4" fmla="*/ 0 w 424"/>
+                <a:gd name="T5" fmla="*/ 38 h 38"/>
+                <a:gd name="T6" fmla="*/ 424 w 424"/>
+                <a:gd name="T7" fmla="*/ 38 h 38"/>
+                <a:gd name="T8" fmla="*/ 415 w 424"/>
+                <a:gd name="T9" fmla="*/ 0 h 38"/>
+              </a:gdLst>
+              <a:ahLst/>
+              <a:cxnLst>
+                <a:cxn ang="0">
+                  <a:pos x="T0" y="T1"/>
+                </a:cxn>
+                <a:cxn ang="0">
+                  <a:pos x="T2" y="T3"/>
+                </a:cxn>
+                <a:cxn ang="0">
+                  <a:pos x="T4" y="T5"/>
+                </a:cxn>
+                <a:cxn ang="0">
+                  <a:pos x="T6" y="T7"/>
+                </a:cxn>
+                <a:cxn ang="0">
+                  <a:pos x="T8" y="T9"/>
+                </a:cxn>
+              </a:cxnLst>
+              <a:rect l="0" t="0" r="r" b="b"/>
+              <a:pathLst>
+                <a:path w="424" h="38">
+                  <a:moveTo>
+                    <a:pt x="415" y="0"/>
+                  </a:moveTo>
+                  <a:lnTo>
+                    <a:pt x="7" y="0"/>
+                  </a:lnTo>
+                  <a:lnTo>
+                    <a:pt x="0" y="38"/>
+                  </a:lnTo>
+                  <a:lnTo>
+                    <a:pt x="424" y="38"/>
+                  </a:lnTo>
+                  <a:lnTo>
+                    <a:pt x="415" y="0"/>
+                  </a:lnTo>
+                </a:path>
+              </a:pathLst>
+            </a:custGeom>
+            <a:noFill/>
+            <a:ln>
+              <a:noFill/>
+            </a:ln>
+            <a:extLst>
+              <a:ext uri="{909E8E84-426E-40dd-AFC4-6F175D3DCCD1}">
+                <a14:hiddenFill xmlns:a14="http://schemas.microsoft.com/office/drawing/2010/main" xmlns="">
+                  <a:solidFill>
+                    <a:srgbClr val="FFFFFF"/>
+                  </a:solidFill>
+                </a14:hiddenFill>
+              </a:ext>
+              <a:ext uri="{91240B29-F687-4f45-9708-019B960494DF}">
+                <a14:hiddenLine xmlns:a14="http://schemas.microsoft.com/office/drawing/2010/main" xmlns="" w="9525">
+                  <a:solidFill>
+                    <a:srgbClr val="000000"/>
+                  </a:solidFill>
+                  <a:round/>
+                  <a:headEnd/>
+                  <a:tailEnd/>
+                </a14:hiddenLine>
+              </a:ext>
+            </a:extLst>
+          </p:spPr>
+          <p:txBody>
+            <a:bodyPr vert="horz" wrap="square" lIns="91440" tIns="45720" rIns="91440" bIns="45720" numCol="1" anchor="t" anchorCtr="0" compatLnSpc="1">
+              <a:prstTxWarp prst="textNoShape">
+                <a:avLst/>
+              </a:prstTxWarp>
+            </a:bodyPr>
+            <a:lstStyle/>
+            <a:p>
+              <a:endParaRPr lang="id-ID"/>
+            </a:p>
+          </p:txBody>
+        </p:sp>
+      </p:grpSp>
+      <p:sp>
+        <p:nvSpPr>
+          <p:cNvPr id="94" name="TextBox 93"/>
+          <p:cNvSpPr txBox="1"/>
+          <p:nvPr/>
+        </p:nvSpPr>
+        <p:spPr>
+          <a:xfrm>
+            <a:off x="5401740" y="4228564"/>
+            <a:ext cx="1298534" cy="307777"/>
+          </a:xfrm>
+          <a:prstGeom prst="rect">
+            <a:avLst/>
+          </a:prstGeom>
+          <a:noFill/>
+        </p:spPr>
+        <p:txBody>
+          <a:bodyPr wrap="square" rtlCol="0">
+            <a:spAutoFit/>
+          </a:bodyPr>
+          <a:lstStyle/>
+          <a:p>
+            <a:pPr algn="ctr"/>
+            <a:r>
+              <a:rPr lang="id-ID" sz="1400" dirty="0" smtClean="0">
+                <a:solidFill>
+                  <a:schemeClr val="bg1"/>
+                </a:solidFill>
+                <a:latin typeface="+mj-lt"/>
+              </a:rPr>
+              <a:t>Web Browser</a:t>
+            </a:r>
+            <a:endParaRPr lang="id-ID" sz="1400" dirty="0">
+              <a:solidFill>
+                <a:schemeClr val="bg1"/>
+              </a:solidFill>
+              <a:latin typeface="+mj-lt"/>
+            </a:endParaRPr>
+          </a:p>
+        </p:txBody>
+      </p:sp>
+      <p:sp>
+        <p:nvSpPr>
+          <p:cNvPr id="98" name="TextBox 97"/>
+          <p:cNvSpPr txBox="1"/>
+          <p:nvPr/>
+        </p:nvSpPr>
+        <p:spPr>
+          <a:xfrm>
+            <a:off x="2793318" y="268876"/>
+            <a:ext cx="6875831" cy="1200329"/>
+          </a:xfrm>
+          <a:prstGeom prst="rect">
+            <a:avLst/>
+          </a:prstGeom>
+          <a:noFill/>
+        </p:spPr>
+        <p:txBody>
+          <a:bodyPr wrap="square" rtlCol="0">
+            <a:spAutoFit/>
+          </a:bodyPr>
+          <a:lstStyle/>
+          <a:p>
+            <a:pPr algn="ctr"/>
+            <a:r>
+              <a:rPr lang="en-US" sz="3600" b="1" dirty="0" smtClean="0">
+                <a:solidFill>
+                  <a:schemeClr val="bg1"/>
+                </a:solidFill>
+              </a:rPr>
+              <a:t>Lesson 2: Setup </a:t>
+            </a:r>
+            <a:r>
+              <a:rPr lang="en-US" sz="3600" b="1" dirty="0">
+                <a:solidFill>
+                  <a:schemeClr val="bg1"/>
+                </a:solidFill>
+              </a:rPr>
+              <a:t>the web site &amp; user </a:t>
+            </a:r>
+            <a:r>
+              <a:rPr lang="en-US" sz="3600" b="1" dirty="0" smtClean="0">
+                <a:solidFill>
+                  <a:schemeClr val="bg1"/>
+                </a:solidFill>
+              </a:rPr>
+              <a:t>authentication</a:t>
+            </a:r>
+            <a:endParaRPr lang="en-US" sz="3600" b="1" dirty="0">
+              <a:solidFill>
+                <a:schemeClr val="bg1"/>
+              </a:solidFill>
+            </a:endParaRPr>
+          </a:p>
+        </p:txBody>
+      </p:sp>
+      <p:sp>
+        <p:nvSpPr>
+          <p:cNvPr id="3" name="Rectangle 2"/>
+          <p:cNvSpPr/>
+          <p:nvPr/>
+        </p:nvSpPr>
+        <p:spPr>
+          <a:xfrm>
+            <a:off x="8551395" y="2645997"/>
+            <a:ext cx="2624606" cy="559326"/>
+          </a:xfrm>
+          <a:prstGeom prst="rect">
+            <a:avLst/>
+          </a:prstGeom>
+          <a:solidFill>
+            <a:schemeClr val="accent1">
+              <a:alpha val="48000"/>
+            </a:schemeClr>
+          </a:solidFill>
+          <a:ln>
+            <a:solidFill>
+              <a:schemeClr val="bg1">
+                <a:lumMod val="75000"/>
+                <a:alpha val="48000"/>
+              </a:schemeClr>
+            </a:solidFill>
+          </a:ln>
+        </p:spPr>
+        <p:style>
+          <a:lnRef idx="2">
+            <a:schemeClr val="accent1">
+              <a:shade val="50000"/>
+            </a:schemeClr>
+          </a:lnRef>
+          <a:fillRef idx="1">
+            <a:schemeClr val="accent1"/>
+          </a:fillRef>
+          <a:effectRef idx="0">
+            <a:schemeClr val="accent1"/>
+          </a:effectRef>
+          <a:fontRef idx="minor">
+            <a:schemeClr val="lt1"/>
+          </a:fontRef>
+        </p:style>
+        <p:txBody>
+          <a:bodyPr rtlCol="0" anchor="ctr"/>
+          <a:lstStyle/>
+          <a:p>
+            <a:pPr algn="ctr"/>
+            <a:r>
+              <a:rPr lang="en-US" dirty="0" smtClean="0">
+                <a:solidFill>
+                  <a:schemeClr val="lt1">
+                    <a:alpha val="49000"/>
+                  </a:schemeClr>
+                </a:solidFill>
+              </a:rPr>
+              <a:t>Video Transcoder</a:t>
+            </a:r>
+            <a:endParaRPr lang="en-US" dirty="0">
+              <a:solidFill>
+                <a:schemeClr val="lt1">
+                  <a:alpha val="49000"/>
+                </a:schemeClr>
+              </a:solidFill>
+            </a:endParaRPr>
+          </a:p>
+        </p:txBody>
+      </p:sp>
+      <p:sp>
+        <p:nvSpPr>
+          <p:cNvPr id="69" name="Rectangle 68"/>
+          <p:cNvSpPr/>
+          <p:nvPr/>
+        </p:nvSpPr>
+        <p:spPr>
+          <a:xfrm>
+            <a:off x="8545712" y="3443613"/>
+            <a:ext cx="2624606" cy="592947"/>
+          </a:xfrm>
+          <a:prstGeom prst="rect">
+            <a:avLst/>
+          </a:prstGeom>
+          <a:solidFill>
+            <a:schemeClr val="accent1">
+              <a:alpha val="48000"/>
+            </a:schemeClr>
+          </a:solidFill>
+          <a:ln>
+            <a:solidFill>
+              <a:schemeClr val="bg1">
+                <a:lumMod val="75000"/>
+                <a:alpha val="48000"/>
+              </a:schemeClr>
+            </a:solidFill>
+          </a:ln>
+        </p:spPr>
+        <p:style>
+          <a:lnRef idx="2">
+            <a:schemeClr val="accent1">
+              <a:shade val="50000"/>
+            </a:schemeClr>
+          </a:lnRef>
+          <a:fillRef idx="1">
+            <a:schemeClr val="accent1"/>
+          </a:fillRef>
+          <a:effectRef idx="0">
+            <a:schemeClr val="accent1"/>
+          </a:effectRef>
+          <a:fontRef idx="minor">
+            <a:schemeClr val="lt1"/>
+          </a:fontRef>
+        </p:style>
+        <p:txBody>
+          <a:bodyPr rtlCol="0" anchor="ctr"/>
+          <a:lstStyle/>
+          <a:p>
+            <a:pPr algn="ctr"/>
+            <a:r>
+              <a:rPr lang="en-US" dirty="0" smtClean="0">
+                <a:solidFill>
+                  <a:schemeClr val="lt1">
+                    <a:alpha val="49000"/>
+                  </a:schemeClr>
+                </a:solidFill>
+              </a:rPr>
+              <a:t>Media Storage</a:t>
+            </a:r>
+            <a:endParaRPr lang="en-US" dirty="0">
+              <a:solidFill>
+                <a:schemeClr val="lt1">
+                  <a:alpha val="49000"/>
+                </a:schemeClr>
+              </a:solidFill>
+            </a:endParaRPr>
+          </a:p>
+        </p:txBody>
+      </p:sp>
+      <p:sp>
+        <p:nvSpPr>
+          <p:cNvPr id="71" name="Rectangle 70"/>
+          <p:cNvSpPr/>
+          <p:nvPr/>
+        </p:nvSpPr>
+        <p:spPr>
+          <a:xfrm>
+            <a:off x="4742102" y="5630897"/>
+            <a:ext cx="2624606" cy="824160"/>
+          </a:xfrm>
+          <a:prstGeom prst="rect">
+            <a:avLst/>
+          </a:prstGeom>
+          <a:solidFill>
+            <a:schemeClr val="accent1">
+              <a:alpha val="5000"/>
+            </a:schemeClr>
+          </a:solidFill>
+          <a:ln>
+            <a:solidFill>
+              <a:schemeClr val="bg1">
+                <a:lumMod val="75000"/>
+                <a:alpha val="5000"/>
+              </a:schemeClr>
+            </a:solidFill>
+          </a:ln>
+        </p:spPr>
+        <p:style>
+          <a:lnRef idx="2">
+            <a:schemeClr val="accent1">
+              <a:shade val="50000"/>
+            </a:schemeClr>
+          </a:lnRef>
+          <a:fillRef idx="1">
+            <a:schemeClr val="accent1"/>
+          </a:fillRef>
+          <a:effectRef idx="0">
+            <a:schemeClr val="accent1"/>
+          </a:effectRef>
+          <a:fontRef idx="minor">
+            <a:schemeClr val="lt1"/>
+          </a:fontRef>
+        </p:style>
+        <p:txBody>
+          <a:bodyPr rtlCol="0" anchor="ctr"/>
+          <a:lstStyle/>
+          <a:p>
+            <a:pPr algn="ctr"/>
+            <a:r>
+              <a:rPr lang="en-US" dirty="0" smtClean="0">
+                <a:solidFill>
+                  <a:schemeClr val="lt1">
+                    <a:alpha val="5000"/>
+                  </a:schemeClr>
+                </a:solidFill>
+              </a:rPr>
+              <a:t>Custom API</a:t>
+            </a:r>
+            <a:endParaRPr lang="en-US" dirty="0">
+              <a:solidFill>
+                <a:schemeClr val="lt1">
+                  <a:alpha val="5000"/>
+                </a:schemeClr>
+              </a:solidFill>
+            </a:endParaRPr>
+          </a:p>
+        </p:txBody>
+      </p:sp>
+      <p:sp>
+        <p:nvSpPr>
+          <p:cNvPr id="72" name="Rectangle 71"/>
+          <p:cNvSpPr/>
+          <p:nvPr/>
+        </p:nvSpPr>
+        <p:spPr>
+          <a:xfrm>
+            <a:off x="1002192" y="1919123"/>
+            <a:ext cx="2624605" cy="824160"/>
+          </a:xfrm>
+          <a:prstGeom prst="rect">
+            <a:avLst/>
+          </a:prstGeom>
+          <a:solidFill>
+            <a:schemeClr val="accent1"/>
+          </a:solidFill>
+          <a:ln>
+            <a:solidFill>
+              <a:schemeClr val="bg1">
+                <a:lumMod val="75000"/>
+              </a:schemeClr>
+            </a:solidFill>
+          </a:ln>
+        </p:spPr>
+        <p:style>
+          <a:lnRef idx="2">
+            <a:schemeClr val="accent1">
+              <a:shade val="50000"/>
+            </a:schemeClr>
+          </a:lnRef>
+          <a:fillRef idx="1">
+            <a:schemeClr val="accent1"/>
+          </a:fillRef>
+          <a:effectRef idx="0">
+            <a:schemeClr val="accent1"/>
+          </a:effectRef>
+          <a:fontRef idx="minor">
+            <a:schemeClr val="lt1"/>
+          </a:fontRef>
+        </p:style>
+        <p:txBody>
+          <a:bodyPr rtlCol="0" anchor="ctr"/>
+          <a:lstStyle/>
+          <a:p>
+            <a:pPr algn="ctr"/>
+            <a:r>
+              <a:rPr lang="en-US" dirty="0" smtClean="0"/>
+              <a:t>Web Application</a:t>
+            </a:r>
+            <a:endParaRPr lang="en-US" dirty="0"/>
+          </a:p>
+        </p:txBody>
+      </p:sp>
+      <p:sp>
+        <p:nvSpPr>
+          <p:cNvPr id="73" name="Rectangle 72"/>
+          <p:cNvSpPr/>
+          <p:nvPr/>
+        </p:nvSpPr>
+        <p:spPr>
+          <a:xfrm>
+            <a:off x="8545712" y="4306004"/>
+            <a:ext cx="2624606" cy="566329"/>
+          </a:xfrm>
+          <a:prstGeom prst="rect">
+            <a:avLst/>
+          </a:prstGeom>
+          <a:solidFill>
+            <a:schemeClr val="accent1">
+              <a:alpha val="5000"/>
+            </a:schemeClr>
+          </a:solidFill>
+          <a:ln>
+            <a:solidFill>
+              <a:schemeClr val="bg1">
+                <a:lumMod val="75000"/>
+                <a:alpha val="5000"/>
+              </a:schemeClr>
+            </a:solidFill>
+          </a:ln>
+        </p:spPr>
+        <p:style>
+          <a:lnRef idx="2">
+            <a:schemeClr val="accent1">
+              <a:shade val="50000"/>
+            </a:schemeClr>
+          </a:lnRef>
+          <a:fillRef idx="1">
+            <a:schemeClr val="accent1"/>
+          </a:fillRef>
+          <a:effectRef idx="0">
+            <a:schemeClr val="accent1"/>
+          </a:effectRef>
+          <a:fontRef idx="minor">
+            <a:schemeClr val="lt1"/>
+          </a:fontRef>
+        </p:style>
+        <p:txBody>
+          <a:bodyPr rtlCol="0" anchor="ctr"/>
+          <a:lstStyle/>
+          <a:p>
+            <a:pPr algn="ctr"/>
+            <a:r>
+              <a:rPr lang="en-US" dirty="0">
+                <a:solidFill>
+                  <a:schemeClr val="lt1">
+                    <a:alpha val="5000"/>
+                  </a:schemeClr>
+                </a:solidFill>
+              </a:rPr>
+              <a:t>Video List Database</a:t>
+            </a:r>
+            <a:endParaRPr lang="en-US" dirty="0">
+              <a:solidFill>
+                <a:schemeClr val="lt1">
+                  <a:alpha val="5000"/>
+                </a:schemeClr>
+              </a:solidFill>
+            </a:endParaRPr>
+          </a:p>
+        </p:txBody>
+      </p:sp>
+      <p:cxnSp>
+        <p:nvCxnSpPr>
+          <p:cNvPr id="74" name="Straight Connector 73"/>
+          <p:cNvCxnSpPr>
+            <a:stCxn id="72" idx="3"/>
+          </p:cNvCxnSpPr>
+          <p:nvPr/>
+        </p:nvCxnSpPr>
+        <p:spPr>
+          <a:xfrm>
+            <a:off x="3626797" y="2331203"/>
+            <a:ext cx="1533768" cy="1022799"/>
+          </a:xfrm>
+          <a:prstGeom prst="line">
+            <a:avLst/>
+          </a:prstGeom>
+          <a:ln w="38100">
+            <a:solidFill>
+              <a:schemeClr val="bg1">
+                <a:lumMod val="75000"/>
+              </a:schemeClr>
+            </a:solidFill>
+            <a:prstDash val="solid"/>
+            <a:headEnd type="none" w="med" len="med"/>
+            <a:tailEnd type="triangle" w="med" len="med"/>
+          </a:ln>
+        </p:spPr>
+        <p:style>
+          <a:lnRef idx="1">
+            <a:schemeClr val="accent1"/>
+          </a:lnRef>
+          <a:fillRef idx="0">
+            <a:schemeClr val="accent1"/>
+          </a:fillRef>
+          <a:effectRef idx="0">
+            <a:schemeClr val="accent1"/>
+          </a:effectRef>
+          <a:fontRef idx="minor">
+            <a:schemeClr val="tx1"/>
+          </a:fontRef>
+        </p:style>
+      </p:cxnSp>
+      <p:cxnSp>
+        <p:nvCxnSpPr>
+          <p:cNvPr id="91" name="Straight Connector 90"/>
+          <p:cNvCxnSpPr>
+            <a:stCxn id="94" idx="2"/>
+            <a:endCxn id="71" idx="0"/>
+          </p:cNvCxnSpPr>
+          <p:nvPr/>
+        </p:nvCxnSpPr>
+        <p:spPr>
+          <a:xfrm>
+            <a:off x="6051007" y="4536341"/>
+            <a:ext cx="3398" cy="1094556"/>
+          </a:xfrm>
+          <a:prstGeom prst="line">
+            <a:avLst/>
+          </a:prstGeom>
+          <a:ln w="38100">
+            <a:solidFill>
+              <a:schemeClr val="bg1">
+                <a:lumMod val="75000"/>
+                <a:alpha val="5000"/>
+              </a:schemeClr>
+            </a:solidFill>
+            <a:prstDash val="solid"/>
+            <a:headEnd type="none" w="med" len="med"/>
+            <a:tailEnd type="triangle" w="med" len="med"/>
+          </a:ln>
+        </p:spPr>
+        <p:style>
+          <a:lnRef idx="1">
+            <a:schemeClr val="accent1"/>
+          </a:lnRef>
+          <a:fillRef idx="0">
+            <a:schemeClr val="accent1"/>
+          </a:fillRef>
+          <a:effectRef idx="0">
+            <a:schemeClr val="accent1"/>
+          </a:effectRef>
+          <a:fontRef idx="minor">
+            <a:schemeClr val="tx1"/>
+          </a:fontRef>
+        </p:style>
+      </p:cxnSp>
+      <p:cxnSp>
+        <p:nvCxnSpPr>
+          <p:cNvPr id="92" name="Straight Connector 91"/>
+          <p:cNvCxnSpPr>
+            <a:stCxn id="3" idx="2"/>
+            <a:endCxn id="69" idx="0"/>
+          </p:cNvCxnSpPr>
+          <p:nvPr/>
+        </p:nvCxnSpPr>
+        <p:spPr>
+          <a:xfrm flipH="1">
+            <a:off x="9858015" y="3205323"/>
+            <a:ext cx="5683" cy="238290"/>
+          </a:xfrm>
+          <a:prstGeom prst="line">
+            <a:avLst/>
+          </a:prstGeom>
+          <a:ln w="38100">
+            <a:solidFill>
+              <a:schemeClr val="bg1">
+                <a:lumMod val="75000"/>
+                <a:alpha val="48000"/>
+              </a:schemeClr>
+            </a:solidFill>
+            <a:prstDash val="solid"/>
+            <a:headEnd type="none" w="med" len="med"/>
+            <a:tailEnd type="triangle" w="med" len="med"/>
+          </a:ln>
+        </p:spPr>
+        <p:style>
+          <a:lnRef idx="1">
+            <a:schemeClr val="accent1"/>
+          </a:lnRef>
+          <a:fillRef idx="0">
+            <a:schemeClr val="accent1"/>
+          </a:fillRef>
+          <a:effectRef idx="0">
+            <a:schemeClr val="accent1"/>
+          </a:effectRef>
+          <a:fontRef idx="minor">
+            <a:schemeClr val="tx1"/>
+          </a:fontRef>
+        </p:style>
+      </p:cxnSp>
+      <p:grpSp>
+        <p:nvGrpSpPr>
+          <p:cNvPr id="76" name="Group 75"/>
+          <p:cNvGrpSpPr/>
+          <p:nvPr/>
+        </p:nvGrpSpPr>
+        <p:grpSpPr>
+          <a:xfrm>
+            <a:off x="5257754" y="3356854"/>
+            <a:ext cx="479416" cy="863449"/>
+            <a:chOff x="7296151" y="4556125"/>
+            <a:chExt cx="758824" cy="1330325"/>
+          </a:xfrm>
+        </p:grpSpPr>
+        <p:sp>
+          <p:nvSpPr>
+            <p:cNvPr id="77" name="Freeform 38"/>
+            <p:cNvSpPr>
+              <a:spLocks/>
+            </p:cNvSpPr>
+            <p:nvPr/>
+          </p:nvSpPr>
+          <p:spPr bwMode="auto">
+            <a:xfrm>
+              <a:off x="7296151" y="4556125"/>
+              <a:ext cx="758824" cy="1330325"/>
+            </a:xfrm>
+            <a:custGeom>
+              <a:avLst/>
+              <a:gdLst>
+                <a:gd name="T0" fmla="*/ 174 w 199"/>
+                <a:gd name="T1" fmla="*/ 0 h 352"/>
+                <a:gd name="T2" fmla="*/ 26 w 199"/>
+                <a:gd name="T3" fmla="*/ 0 h 352"/>
+                <a:gd name="T4" fmla="*/ 0 w 199"/>
+                <a:gd name="T5" fmla="*/ 26 h 352"/>
+                <a:gd name="T6" fmla="*/ 0 w 199"/>
+                <a:gd name="T7" fmla="*/ 327 h 352"/>
+                <a:gd name="T8" fmla="*/ 26 w 199"/>
+                <a:gd name="T9" fmla="*/ 352 h 352"/>
+                <a:gd name="T10" fmla="*/ 174 w 199"/>
+                <a:gd name="T11" fmla="*/ 352 h 352"/>
+                <a:gd name="T12" fmla="*/ 199 w 199"/>
+                <a:gd name="T13" fmla="*/ 327 h 352"/>
+                <a:gd name="T14" fmla="*/ 199 w 199"/>
+                <a:gd name="T15" fmla="*/ 26 h 352"/>
+                <a:gd name="T16" fmla="*/ 174 w 199"/>
+                <a:gd name="T17" fmla="*/ 0 h 352"/>
+              </a:gdLst>
+              <a:ahLst/>
+              <a:cxnLst>
+                <a:cxn ang="0">
+                  <a:pos x="T0" y="T1"/>
+                </a:cxn>
+                <a:cxn ang="0">
+                  <a:pos x="T2" y="T3"/>
+                </a:cxn>
+                <a:cxn ang="0">
+                  <a:pos x="T4" y="T5"/>
+                </a:cxn>
+                <a:cxn ang="0">
+                  <a:pos x="T6" y="T7"/>
+                </a:cxn>
+                <a:cxn ang="0">
+                  <a:pos x="T8" y="T9"/>
+                </a:cxn>
+                <a:cxn ang="0">
+                  <a:pos x="T10" y="T11"/>
+                </a:cxn>
+                <a:cxn ang="0">
+                  <a:pos x="T12" y="T13"/>
+                </a:cxn>
+                <a:cxn ang="0">
+                  <a:pos x="T14" y="T15"/>
+                </a:cxn>
+                <a:cxn ang="0">
+                  <a:pos x="T16" y="T17"/>
+                </a:cxn>
+              </a:cxnLst>
+              <a:rect l="0" t="0" r="r" b="b"/>
+              <a:pathLst>
+                <a:path w="199" h="352">
+                  <a:moveTo>
+                    <a:pt x="174" y="0"/>
+                  </a:moveTo>
+                  <a:cubicBezTo>
+                    <a:pt x="26" y="0"/>
+                    <a:pt x="26" y="0"/>
+                    <a:pt x="26" y="0"/>
+                  </a:cubicBezTo>
+                  <a:cubicBezTo>
+                    <a:pt x="11" y="0"/>
+                    <a:pt x="0" y="12"/>
+                    <a:pt x="0" y="26"/>
+                  </a:cubicBezTo>
+                  <a:cubicBezTo>
+                    <a:pt x="0" y="327"/>
+                    <a:pt x="0" y="327"/>
+                    <a:pt x="0" y="327"/>
+                  </a:cubicBezTo>
+                  <a:cubicBezTo>
+                    <a:pt x="0" y="341"/>
+                    <a:pt x="11" y="352"/>
+                    <a:pt x="26" y="352"/>
+                  </a:cubicBezTo>
+                  <a:cubicBezTo>
+                    <a:pt x="174" y="352"/>
+                    <a:pt x="174" y="352"/>
+                    <a:pt x="174" y="352"/>
+                  </a:cubicBezTo>
+                  <a:cubicBezTo>
+                    <a:pt x="188" y="352"/>
+                    <a:pt x="199" y="341"/>
+                    <a:pt x="199" y="327"/>
+                  </a:cubicBezTo>
+                  <a:cubicBezTo>
+                    <a:pt x="199" y="26"/>
+                    <a:pt x="199" y="26"/>
+                    <a:pt x="199" y="26"/>
+                  </a:cubicBezTo>
+                  <a:cubicBezTo>
+                    <a:pt x="199" y="12"/>
+                    <a:pt x="188" y="0"/>
+                    <a:pt x="174" y="0"/>
+                  </a:cubicBezTo>
+                  <a:close/>
+                </a:path>
+              </a:pathLst>
+            </a:custGeom>
+            <a:solidFill>
+              <a:schemeClr val="tx1">
+                <a:lumMod val="65000"/>
+                <a:lumOff val="35000"/>
+              </a:schemeClr>
+            </a:solidFill>
+            <a:ln>
+              <a:noFill/>
+            </a:ln>
+            <a:effectLst>
+              <a:outerShdw blurRad="127000" dir="13500000" sy="23000" kx="1200000" algn="br" rotWithShape="0">
+                <a:prstClr val="black">
+                  <a:alpha val="10000"/>
+                </a:prstClr>
+              </a:outerShdw>
+            </a:effectLst>
+          </p:spPr>
+          <p:txBody>
+            <a:bodyPr vert="horz" wrap="square" lIns="91440" tIns="45720" rIns="91440" bIns="45720" numCol="1" anchor="t" anchorCtr="0" compatLnSpc="1">
+              <a:prstTxWarp prst="textNoShape">
+                <a:avLst/>
+              </a:prstTxWarp>
+            </a:bodyPr>
+            <a:lstStyle/>
+            <a:p>
+              <a:endParaRPr lang="id-ID"/>
+            </a:p>
+          </p:txBody>
+        </p:sp>
+        <p:sp>
+          <p:nvSpPr>
+            <p:cNvPr id="78" name="Rectangle 39"/>
+            <p:cNvSpPr>
+              <a:spLocks noChangeArrowheads="1"/>
+            </p:cNvSpPr>
+            <p:nvPr/>
+          </p:nvSpPr>
+          <p:spPr bwMode="auto">
+            <a:xfrm>
+              <a:off x="7379223" y="4718050"/>
+              <a:ext cx="612775" cy="919163"/>
+            </a:xfrm>
+            <a:prstGeom prst="rect">
+              <a:avLst/>
+            </a:prstGeom>
+            <a:solidFill>
+              <a:schemeClr val="accent6"/>
+            </a:solidFill>
+            <a:ln>
+              <a:noFill/>
+            </a:ln>
+          </p:spPr>
+          <p:txBody>
+            <a:bodyPr vert="horz" wrap="square" lIns="91440" tIns="45720" rIns="91440" bIns="45720" numCol="1" anchor="t" anchorCtr="0" compatLnSpc="1">
+              <a:prstTxWarp prst="textNoShape">
+                <a:avLst/>
+              </a:prstTxWarp>
+            </a:bodyPr>
+            <a:lstStyle/>
+            <a:p>
+              <a:endParaRPr lang="id-ID"/>
+            </a:p>
+          </p:txBody>
+        </p:sp>
+        <p:sp>
+          <p:nvSpPr>
+            <p:cNvPr id="79" name="Freeform 40"/>
+            <p:cNvSpPr>
+              <a:spLocks/>
+            </p:cNvSpPr>
+            <p:nvPr/>
+          </p:nvSpPr>
+          <p:spPr bwMode="auto">
+            <a:xfrm>
+              <a:off x="7543800" y="4627563"/>
+              <a:ext cx="263525" cy="26988"/>
+            </a:xfrm>
+            <a:custGeom>
+              <a:avLst/>
+              <a:gdLst>
+                <a:gd name="T0" fmla="*/ 166 w 166"/>
+                <a:gd name="T1" fmla="*/ 17 h 17"/>
+                <a:gd name="T2" fmla="*/ 0 w 166"/>
+                <a:gd name="T3" fmla="*/ 17 h 17"/>
+                <a:gd name="T4" fmla="*/ 0 w 166"/>
+                <a:gd name="T5" fmla="*/ 0 h 17"/>
+                <a:gd name="T6" fmla="*/ 166 w 166"/>
+                <a:gd name="T7" fmla="*/ 0 h 17"/>
+                <a:gd name="T8" fmla="*/ 166 w 166"/>
+                <a:gd name="T9" fmla="*/ 17 h 17"/>
+                <a:gd name="T10" fmla="*/ 166 w 166"/>
+                <a:gd name="T11" fmla="*/ 17 h 17"/>
+              </a:gdLst>
+              <a:ahLst/>
+              <a:cxnLst>
+                <a:cxn ang="0">
+                  <a:pos x="T0" y="T1"/>
+                </a:cxn>
+                <a:cxn ang="0">
+                  <a:pos x="T2" y="T3"/>
+                </a:cxn>
+                <a:cxn ang="0">
+                  <a:pos x="T4" y="T5"/>
+                </a:cxn>
+                <a:cxn ang="0">
+                  <a:pos x="T6" y="T7"/>
+                </a:cxn>
+                <a:cxn ang="0">
+                  <a:pos x="T8" y="T9"/>
+                </a:cxn>
+                <a:cxn ang="0">
+                  <a:pos x="T10" y="T11"/>
+                </a:cxn>
+              </a:cxnLst>
+              <a:rect l="0" t="0" r="r" b="b"/>
+              <a:pathLst>
+                <a:path w="166" h="17">
+                  <a:moveTo>
+                    <a:pt x="166" y="17"/>
+                  </a:moveTo>
+                  <a:lnTo>
+                    <a:pt x="0" y="17"/>
+                  </a:lnTo>
+                  <a:lnTo>
+                    <a:pt x="0" y="0"/>
+                  </a:lnTo>
+                  <a:lnTo>
+                    <a:pt x="166" y="0"/>
+                  </a:lnTo>
+                  <a:lnTo>
+                    <a:pt x="166" y="17"/>
+                  </a:lnTo>
+                  <a:lnTo>
+                    <a:pt x="166" y="17"/>
+                  </a:lnTo>
+                  <a:close/>
+                </a:path>
+              </a:pathLst>
+            </a:custGeom>
+            <a:solidFill>
+              <a:srgbClr val="FFFFFF"/>
+            </a:solidFill>
+            <a:ln>
+              <a:noFill/>
+            </a:ln>
+            <a:extLst>
+              <a:ext uri="{91240B29-F687-4f45-9708-019B960494DF}">
+                <a14:hiddenLine xmlns:a14="http://schemas.microsoft.com/office/drawing/2010/main" xmlns="" w="9525">
+                  <a:solidFill>
+                    <a:srgbClr val="000000"/>
+                  </a:solidFill>
+                  <a:round/>
+                  <a:headEnd/>
+                  <a:tailEnd/>
+                </a14:hiddenLine>
+              </a:ext>
+            </a:extLst>
+          </p:spPr>
+          <p:txBody>
+            <a:bodyPr vert="horz" wrap="square" lIns="91440" tIns="45720" rIns="91440" bIns="45720" numCol="1" anchor="t" anchorCtr="0" compatLnSpc="1">
+              <a:prstTxWarp prst="textNoShape">
+                <a:avLst/>
+              </a:prstTxWarp>
+            </a:bodyPr>
+            <a:lstStyle/>
+            <a:p>
+              <a:endParaRPr lang="id-ID"/>
+            </a:p>
+          </p:txBody>
+        </p:sp>
+        <p:sp>
+          <p:nvSpPr>
+            <p:cNvPr id="80" name="Oval 41"/>
+            <p:cNvSpPr>
+              <a:spLocks noChangeArrowheads="1"/>
+            </p:cNvSpPr>
+            <p:nvPr/>
+          </p:nvSpPr>
+          <p:spPr bwMode="auto">
+            <a:xfrm>
+              <a:off x="7867650" y="4616450"/>
+              <a:ext cx="50800" cy="49213"/>
+            </a:xfrm>
+            <a:prstGeom prst="ellipse">
+              <a:avLst/>
+            </a:prstGeom>
+            <a:solidFill>
+              <a:srgbClr val="FFFFFF"/>
+            </a:solidFill>
+            <a:ln>
+              <a:noFill/>
+            </a:ln>
+            <a:extLst>
+              <a:ext uri="{91240B29-F687-4f45-9708-019B960494DF}">
+                <a14:hiddenLine xmlns:a14="http://schemas.microsoft.com/office/drawing/2010/main" xmlns="" w="9525">
+                  <a:solidFill>
+                    <a:srgbClr val="000000"/>
+                  </a:solidFill>
+                  <a:round/>
+                  <a:headEnd/>
+                  <a:tailEnd/>
+                </a14:hiddenLine>
+              </a:ext>
+            </a:extLst>
+          </p:spPr>
+          <p:txBody>
+            <a:bodyPr vert="horz" wrap="square" lIns="91440" tIns="45720" rIns="91440" bIns="45720" numCol="1" anchor="t" anchorCtr="0" compatLnSpc="1">
+              <a:prstTxWarp prst="textNoShape">
+                <a:avLst/>
+              </a:prstTxWarp>
+            </a:bodyPr>
+            <a:lstStyle/>
+            <a:p>
+              <a:endParaRPr lang="id-ID"/>
+            </a:p>
+          </p:txBody>
+        </p:sp>
+        <p:sp>
+          <p:nvSpPr>
+            <p:cNvPr id="81" name="Rectangle 42"/>
+            <p:cNvSpPr>
+              <a:spLocks noChangeArrowheads="1"/>
+            </p:cNvSpPr>
+            <p:nvPr/>
+          </p:nvSpPr>
+          <p:spPr bwMode="auto">
+            <a:xfrm>
+              <a:off x="7556500" y="5713413"/>
+              <a:ext cx="239712" cy="71438"/>
+            </a:xfrm>
+            <a:prstGeom prst="rect">
+              <a:avLst/>
+            </a:prstGeom>
+            <a:solidFill>
+              <a:srgbClr val="FFFFFF"/>
+            </a:solidFill>
+            <a:ln>
+              <a:noFill/>
+            </a:ln>
+            <a:extLst>
+              <a:ext uri="{91240B29-F687-4f45-9708-019B960494DF}">
+                <a14:hiddenLine xmlns:a14="http://schemas.microsoft.com/office/drawing/2010/main" xmlns="" w="9525">
+                  <a:solidFill>
+                    <a:srgbClr val="000000"/>
+                  </a:solidFill>
+                  <a:miter lim="800000"/>
+                  <a:headEnd/>
+                  <a:tailEnd/>
+                </a14:hiddenLine>
+              </a:ext>
+            </a:extLst>
+          </p:spPr>
+          <p:txBody>
+            <a:bodyPr vert="horz" wrap="square" lIns="91440" tIns="45720" rIns="91440" bIns="45720" numCol="1" anchor="t" anchorCtr="0" compatLnSpc="1">
+              <a:prstTxWarp prst="textNoShape">
+                <a:avLst/>
+              </a:prstTxWarp>
+            </a:bodyPr>
+            <a:lstStyle/>
+            <a:p>
+              <a:endParaRPr lang="id-ID"/>
+            </a:p>
+          </p:txBody>
+        </p:sp>
+      </p:grpSp>
+      <p:cxnSp>
+        <p:nvCxnSpPr>
+          <p:cNvPr id="96" name="Straight Connector 95"/>
+          <p:cNvCxnSpPr>
+            <a:endCxn id="117" idx="1"/>
+          </p:cNvCxnSpPr>
+          <p:nvPr/>
+        </p:nvCxnSpPr>
+        <p:spPr>
+          <a:xfrm flipV="1">
+            <a:off x="6797463" y="2124101"/>
+            <a:ext cx="1748249" cy="1192040"/>
+          </a:xfrm>
+          <a:prstGeom prst="line">
+            <a:avLst/>
+          </a:prstGeom>
+          <a:ln w="38100">
+            <a:solidFill>
+              <a:schemeClr val="bg1">
+                <a:lumMod val="75000"/>
+                <a:alpha val="5000"/>
+              </a:schemeClr>
+            </a:solidFill>
+            <a:prstDash val="solid"/>
+            <a:headEnd type="none" w="med" len="med"/>
+            <a:tailEnd type="triangle" w="med" len="med"/>
+          </a:ln>
+        </p:spPr>
+        <p:style>
+          <a:lnRef idx="1">
+            <a:schemeClr val="accent1"/>
+          </a:lnRef>
+          <a:fillRef idx="0">
+            <a:schemeClr val="accent1"/>
+          </a:fillRef>
+          <a:effectRef idx="0">
+            <a:schemeClr val="accent1"/>
+          </a:effectRef>
+          <a:fontRef idx="minor">
+            <a:schemeClr val="tx1"/>
+          </a:fontRef>
+        </p:style>
+      </p:cxnSp>
+      <p:cxnSp>
+        <p:nvCxnSpPr>
+          <p:cNvPr id="97" name="Straight Connector 96"/>
+          <p:cNvCxnSpPr>
+            <a:stCxn id="69" idx="2"/>
+            <a:endCxn id="73" idx="0"/>
+          </p:cNvCxnSpPr>
+          <p:nvPr/>
+        </p:nvCxnSpPr>
+        <p:spPr>
+          <a:xfrm>
+            <a:off x="9858015" y="4036560"/>
+            <a:ext cx="0" cy="269444"/>
+          </a:xfrm>
+          <a:prstGeom prst="line">
+            <a:avLst/>
+          </a:prstGeom>
+          <a:ln w="38100">
+            <a:solidFill>
+              <a:schemeClr val="bg1">
+                <a:lumMod val="75000"/>
+                <a:alpha val="5000"/>
+              </a:schemeClr>
+            </a:solidFill>
+            <a:prstDash val="solid"/>
+            <a:headEnd type="none" w="med" len="med"/>
+            <a:tailEnd type="triangle" w="med" len="med"/>
+          </a:ln>
+        </p:spPr>
+        <p:style>
+          <a:lnRef idx="1">
+            <a:schemeClr val="accent1"/>
+          </a:lnRef>
+          <a:fillRef idx="0">
+            <a:schemeClr val="accent1"/>
+          </a:fillRef>
+          <a:effectRef idx="0">
+            <a:schemeClr val="accent1"/>
+          </a:effectRef>
+          <a:fontRef idx="minor">
+            <a:schemeClr val="tx1"/>
+          </a:fontRef>
+        </p:style>
+      </p:cxnSp>
+      <p:cxnSp>
+        <p:nvCxnSpPr>
+          <p:cNvPr id="99" name="Straight Connector 98"/>
+          <p:cNvCxnSpPr>
+            <a:stCxn id="73" idx="1"/>
+          </p:cNvCxnSpPr>
+          <p:nvPr/>
+        </p:nvCxnSpPr>
+        <p:spPr>
+          <a:xfrm flipH="1" flipV="1">
+            <a:off x="6750550" y="3564941"/>
+            <a:ext cx="1795162" cy="1024228"/>
+          </a:xfrm>
+          <a:prstGeom prst="line">
+            <a:avLst/>
+          </a:prstGeom>
+          <a:ln w="38100">
+            <a:solidFill>
+              <a:schemeClr val="bg1">
+                <a:lumMod val="75000"/>
+                <a:alpha val="5000"/>
+              </a:schemeClr>
+            </a:solidFill>
+            <a:prstDash val="solid"/>
+            <a:headEnd type="none" w="med" len="med"/>
+            <a:tailEnd type="triangle" w="med" len="med"/>
+          </a:ln>
+        </p:spPr>
+        <p:style>
+          <a:lnRef idx="1">
+            <a:schemeClr val="accent1"/>
+          </a:lnRef>
+          <a:fillRef idx="0">
+            <a:schemeClr val="accent1"/>
+          </a:fillRef>
+          <a:effectRef idx="0">
+            <a:schemeClr val="accent1"/>
+          </a:effectRef>
+          <a:fontRef idx="minor">
+            <a:schemeClr val="tx1"/>
+          </a:fontRef>
+        </p:style>
+      </p:cxnSp>
+      <p:pic>
+        <p:nvPicPr>
+          <p:cNvPr id="101" name="Picture 100"/>
+          <p:cNvPicPr>
+            <a:picLocks noChangeAspect="1"/>
+          </p:cNvPicPr>
+          <p:nvPr/>
+        </p:nvPicPr>
+        <p:blipFill>
+          <a:blip r:embed="rId3">
+            <a:extLst>
+              <a:ext uri="{28A0092B-C50C-407E-A947-70E740481C1C}">
+                <a14:useLocalDpi xmlns:a14="http://schemas.microsoft.com/office/drawing/2010/main" val="0"/>
+              </a:ext>
+            </a:extLst>
+          </a:blip>
+          <a:stretch>
+            <a:fillRect/>
+          </a:stretch>
+        </p:blipFill>
+        <p:spPr>
+          <a:xfrm>
+            <a:off x="10792106" y="10173273"/>
+            <a:ext cx="301588" cy="333334"/>
+          </a:xfrm>
+          <a:prstGeom prst="rect">
+            <a:avLst/>
+          </a:prstGeom>
+        </p:spPr>
+      </p:pic>
+      <p:pic>
+        <p:nvPicPr>
+          <p:cNvPr id="103" name="Picture 102"/>
+          <p:cNvPicPr>
+            <a:picLocks noChangeAspect="1"/>
+          </p:cNvPicPr>
+          <p:nvPr/>
+        </p:nvPicPr>
+        <p:blipFill>
+          <a:blip r:embed="rId3">
+            <a:extLst>
+              <a:ext uri="{28A0092B-C50C-407E-A947-70E740481C1C}">
+                <a14:useLocalDpi xmlns:a14="http://schemas.microsoft.com/office/drawing/2010/main" val="0"/>
+              </a:ext>
+            </a:extLst>
+          </a:blip>
+          <a:stretch>
+            <a:fillRect/>
+          </a:stretch>
+        </p:blipFill>
+        <p:spPr>
+          <a:xfrm>
+            <a:off x="14620468" y="4734206"/>
+            <a:ext cx="301588" cy="333334"/>
+          </a:xfrm>
+          <a:prstGeom prst="rect">
+            <a:avLst/>
+          </a:prstGeom>
+        </p:spPr>
+      </p:pic>
+      <p:sp>
+        <p:nvSpPr>
+          <p:cNvPr id="105" name="Rectangle 104"/>
+          <p:cNvSpPr/>
+          <p:nvPr/>
+        </p:nvSpPr>
+        <p:spPr>
+          <a:xfrm>
+            <a:off x="1017495" y="3941948"/>
+            <a:ext cx="2624606" cy="824160"/>
+          </a:xfrm>
+          <a:prstGeom prst="rect">
+            <a:avLst/>
+          </a:prstGeom>
+          <a:solidFill>
+            <a:schemeClr val="accent1"/>
+          </a:solidFill>
+          <a:ln>
+            <a:solidFill>
+              <a:schemeClr val="bg1">
+                <a:lumMod val="75000"/>
+              </a:schemeClr>
+            </a:solidFill>
+          </a:ln>
+        </p:spPr>
+        <p:style>
+          <a:lnRef idx="2">
+            <a:schemeClr val="accent1">
+              <a:shade val="50000"/>
+            </a:schemeClr>
+          </a:lnRef>
+          <a:fillRef idx="1">
+            <a:schemeClr val="accent1"/>
+          </a:fillRef>
+          <a:effectRef idx="0">
+            <a:schemeClr val="accent1"/>
+          </a:effectRef>
+          <a:fontRef idx="minor">
+            <a:schemeClr val="lt1"/>
+          </a:fontRef>
+        </p:style>
+        <p:txBody>
+          <a:bodyPr rtlCol="0" anchor="ctr"/>
+          <a:lstStyle/>
+          <a:p>
+            <a:pPr algn="ctr"/>
+            <a:r>
+              <a:rPr lang="en-US" dirty="0" smtClean="0"/>
+              <a:t>Authentication</a:t>
+            </a:r>
+            <a:endParaRPr lang="en-US" dirty="0"/>
+          </a:p>
+        </p:txBody>
+      </p:sp>
+      <p:cxnSp>
+        <p:nvCxnSpPr>
+          <p:cNvPr id="106" name="Straight Connector 105"/>
+          <p:cNvCxnSpPr>
+            <a:stCxn id="105" idx="3"/>
+          </p:cNvCxnSpPr>
+          <p:nvPr/>
+        </p:nvCxnSpPr>
+        <p:spPr>
+          <a:xfrm flipV="1">
+            <a:off x="3642101" y="3660383"/>
+            <a:ext cx="1518464" cy="693645"/>
+          </a:xfrm>
+          <a:prstGeom prst="line">
+            <a:avLst/>
+          </a:prstGeom>
+          <a:ln w="38100">
+            <a:solidFill>
+              <a:schemeClr val="bg1">
+                <a:lumMod val="75000"/>
+              </a:schemeClr>
+            </a:solidFill>
+            <a:prstDash val="solid"/>
+            <a:headEnd type="triangle" w="med" len="med"/>
+            <a:tailEnd type="triangle" w="med" len="med"/>
+          </a:ln>
+        </p:spPr>
+        <p:style>
+          <a:lnRef idx="1">
+            <a:schemeClr val="accent1"/>
+          </a:lnRef>
+          <a:fillRef idx="0">
+            <a:schemeClr val="accent1"/>
+          </a:fillRef>
+          <a:effectRef idx="0">
+            <a:schemeClr val="accent1"/>
+          </a:effectRef>
+          <a:fontRef idx="minor">
+            <a:schemeClr val="tx1"/>
+          </a:fontRef>
+        </p:style>
+      </p:cxnSp>
+      <p:sp>
+        <p:nvSpPr>
+          <p:cNvPr id="117" name="Rectangle 116"/>
+          <p:cNvSpPr/>
+          <p:nvPr/>
+        </p:nvSpPr>
+        <p:spPr>
+          <a:xfrm>
+            <a:off x="8545712" y="1844438"/>
+            <a:ext cx="2624606" cy="559326"/>
+          </a:xfrm>
+          <a:prstGeom prst="rect">
+            <a:avLst/>
+          </a:prstGeom>
+          <a:solidFill>
+            <a:schemeClr val="accent1">
+              <a:alpha val="5000"/>
+            </a:schemeClr>
+          </a:solidFill>
+          <a:ln>
+            <a:solidFill>
+              <a:schemeClr val="bg1">
+                <a:lumMod val="75000"/>
+                <a:alpha val="5000"/>
+              </a:schemeClr>
+            </a:solidFill>
+          </a:ln>
+        </p:spPr>
+        <p:style>
+          <a:lnRef idx="2">
+            <a:schemeClr val="accent1">
+              <a:shade val="50000"/>
+            </a:schemeClr>
+          </a:lnRef>
+          <a:fillRef idx="1">
+            <a:schemeClr val="accent1"/>
+          </a:fillRef>
+          <a:effectRef idx="0">
+            <a:schemeClr val="accent1"/>
+          </a:effectRef>
+          <a:fontRef idx="minor">
+            <a:schemeClr val="lt1"/>
+          </a:fontRef>
+        </p:style>
+        <p:txBody>
+          <a:bodyPr rtlCol="0" anchor="ctr"/>
+          <a:lstStyle/>
+          <a:p>
+            <a:pPr algn="ctr"/>
+            <a:r>
+              <a:rPr lang="en-US" dirty="0" smtClean="0">
+                <a:solidFill>
+                  <a:schemeClr val="lt1">
+                    <a:alpha val="5000"/>
+                  </a:schemeClr>
+                </a:solidFill>
+              </a:rPr>
+              <a:t>Video Upload</a:t>
+            </a:r>
+            <a:endParaRPr lang="en-US" dirty="0">
+              <a:solidFill>
+                <a:schemeClr val="lt1">
+                  <a:alpha val="5000"/>
+                </a:schemeClr>
+              </a:solidFill>
+            </a:endParaRPr>
+          </a:p>
+        </p:txBody>
+      </p:sp>
+      <p:cxnSp>
+        <p:nvCxnSpPr>
+          <p:cNvPr id="118" name="Straight Connector 117"/>
+          <p:cNvCxnSpPr>
+            <a:endCxn id="3" idx="0"/>
+          </p:cNvCxnSpPr>
+          <p:nvPr/>
+        </p:nvCxnSpPr>
+        <p:spPr>
+          <a:xfrm flipH="1">
+            <a:off x="9863698" y="2401280"/>
+            <a:ext cx="1" cy="244717"/>
+          </a:xfrm>
+          <a:prstGeom prst="line">
+            <a:avLst/>
+          </a:prstGeom>
+          <a:ln w="38100">
+            <a:solidFill>
+              <a:schemeClr val="bg1">
+                <a:lumMod val="75000"/>
+                <a:alpha val="5000"/>
+              </a:schemeClr>
+            </a:solidFill>
+            <a:prstDash val="solid"/>
+            <a:headEnd type="none" w="med" len="med"/>
+            <a:tailEnd type="triangle" w="med" len="med"/>
+          </a:ln>
+        </p:spPr>
+        <p:style>
+          <a:lnRef idx="1">
+            <a:schemeClr val="accent1"/>
+          </a:lnRef>
+          <a:fillRef idx="0">
+            <a:schemeClr val="accent1"/>
+          </a:fillRef>
+          <a:effectRef idx="0">
+            <a:schemeClr val="accent1"/>
+          </a:effectRef>
+          <a:fontRef idx="minor">
+            <a:schemeClr val="tx1"/>
+          </a:fontRef>
+        </p:style>
+      </p:cxnSp>
+    </p:spTree>
+    <p:extLst>
+      <p:ext uri="{BB962C8B-B14F-4D97-AF65-F5344CB8AC3E}">
+        <p14:creationId xmlns:p14="http://schemas.microsoft.com/office/powerpoint/2010/main" val="606061820"/>
+      </p:ext>
+    </p:extLst>
+  </p:cSld>
+  <p:clrMapOvr>
+    <a:masterClrMapping/>
+  </p:clrMapOvr>
+  <p:transition>
+    <p:push dir="u"/>
+  </p:transition>
+  <p:timing>
+    <p:tnLst>
+      <p:par>
+        <p:cTn id="1" dur="indefinite" restart="never" nodeType="tmRoot"/>
+      </p:par>
+    </p:tnLst>
+  </p:timing>
+</p:sld>
+</file>
+
+<file path=ppt/slides/slide3.xml><?xml version="1.0" encoding="utf-8"?>
+<p:sld xmlns:a="http://schemas.openxmlformats.org/drawingml/2006/main" xmlns:r="http://schemas.openxmlformats.org/officeDocument/2006/relationships" xmlns:p="http://schemas.openxmlformats.org/presentationml/2006/main">
+  <p:cSld>
+    <p:bg>
+      <p:bgPr>
+        <a:solidFill>
           <a:srgbClr val="222935"/>
         </a:solidFill>
         <a:effectLst/>
@@ -31424,7 +34104,7 @@
 </p:sld>
 </file>
 
-<file path=ppt/slides/slide3.xml><?xml version="1.0" encoding="utf-8"?>
+<file path=ppt/slides/slide4.xml><?xml version="1.0" encoding="utf-8"?>
 <p:sld xmlns:a="http://schemas.openxmlformats.org/drawingml/2006/main" xmlns:r="http://schemas.openxmlformats.org/officeDocument/2006/relationships" xmlns:p="http://schemas.openxmlformats.org/presentationml/2006/main">
   <p:cSld>
     <p:bg>
@@ -34086,7 +36766,2171 @@
 </p:sld>
 </file>
 
-<file path=ppt/slides/slide4.xml><?xml version="1.0" encoding="utf-8"?>
+<file path=ppt/slides/slide5.xml><?xml version="1.0" encoding="utf-8"?>
+<p:sld xmlns:a="http://schemas.openxmlformats.org/drawingml/2006/main" xmlns:r="http://schemas.openxmlformats.org/officeDocument/2006/relationships" xmlns:p="http://schemas.openxmlformats.org/presentationml/2006/main">
+  <p:cSld>
+    <p:bg>
+      <p:bgPr>
+        <a:solidFill>
+          <a:srgbClr val="222835"/>
+        </a:solidFill>
+        <a:effectLst/>
+      </p:bgPr>
+    </p:bg>
+    <p:spTree>
+      <p:nvGrpSpPr>
+        <p:cNvPr id="1" name=""/>
+        <p:cNvGrpSpPr/>
+        <p:nvPr/>
+      </p:nvGrpSpPr>
+      <p:grpSpPr>
+        <a:xfrm>
+          <a:off x="0" y="0"/>
+          <a:ext cx="0" cy="0"/>
+          <a:chOff x="0" y="0"/>
+          <a:chExt cx="0" cy="0"/>
+        </a:xfrm>
+      </p:grpSpPr>
+      <p:grpSp>
+        <p:nvGrpSpPr>
+          <p:cNvPr id="18" name="Group 17"/>
+          <p:cNvGrpSpPr/>
+          <p:nvPr/>
+        </p:nvGrpSpPr>
+        <p:grpSpPr>
+          <a:xfrm>
+            <a:off x="2" y="6736617"/>
+            <a:ext cx="12191999" cy="134339"/>
+            <a:chOff x="2" y="2110197"/>
+            <a:chExt cx="12191999" cy="134339"/>
+          </a:xfrm>
+        </p:grpSpPr>
+        <p:sp>
+          <p:nvSpPr>
+            <p:cNvPr id="19" name="Rectangle 18"/>
+            <p:cNvSpPr/>
+            <p:nvPr/>
+          </p:nvSpPr>
+          <p:spPr>
+            <a:xfrm rot="16200000">
+              <a:off x="2980836" y="1161370"/>
+              <a:ext cx="134333" cy="2032000"/>
+            </a:xfrm>
+            <a:prstGeom prst="rect">
+              <a:avLst/>
+            </a:prstGeom>
+            <a:solidFill>
+              <a:schemeClr val="accent1">
+                <a:lumMod val="75000"/>
+              </a:schemeClr>
+            </a:solidFill>
+            <a:ln>
+              <a:noFill/>
+            </a:ln>
+          </p:spPr>
+          <p:style>
+            <a:lnRef idx="2">
+              <a:schemeClr val="accent1">
+                <a:shade val="50000"/>
+              </a:schemeClr>
+            </a:lnRef>
+            <a:fillRef idx="1">
+              <a:schemeClr val="accent1"/>
+            </a:fillRef>
+            <a:effectRef idx="0">
+              <a:schemeClr val="accent1"/>
+            </a:effectRef>
+            <a:fontRef idx="minor">
+              <a:schemeClr val="lt1"/>
+            </a:fontRef>
+          </p:style>
+          <p:txBody>
+            <a:bodyPr rtlCol="0" anchor="ctr"/>
+            <a:lstStyle/>
+            <a:p>
+              <a:pPr algn="ctr"/>
+              <a:endParaRPr lang="id-ID"/>
+            </a:p>
+          </p:txBody>
+        </p:sp>
+        <p:sp>
+          <p:nvSpPr>
+            <p:cNvPr id="20" name="Rectangle 19"/>
+            <p:cNvSpPr/>
+            <p:nvPr/>
+          </p:nvSpPr>
+          <p:spPr>
+            <a:xfrm rot="16200000">
+              <a:off x="5012835" y="1161369"/>
+              <a:ext cx="134333" cy="2032000"/>
+            </a:xfrm>
+            <a:prstGeom prst="rect">
+              <a:avLst/>
+            </a:prstGeom>
+            <a:solidFill>
+              <a:schemeClr val="accent2">
+                <a:lumMod val="75000"/>
+              </a:schemeClr>
+            </a:solidFill>
+            <a:ln>
+              <a:noFill/>
+            </a:ln>
+          </p:spPr>
+          <p:style>
+            <a:lnRef idx="2">
+              <a:schemeClr val="accent1">
+                <a:shade val="50000"/>
+              </a:schemeClr>
+            </a:lnRef>
+            <a:fillRef idx="1">
+              <a:schemeClr val="accent1"/>
+            </a:fillRef>
+            <a:effectRef idx="0">
+              <a:schemeClr val="accent1"/>
+            </a:effectRef>
+            <a:fontRef idx="minor">
+              <a:schemeClr val="lt1"/>
+            </a:fontRef>
+          </p:style>
+          <p:txBody>
+            <a:bodyPr rtlCol="0" anchor="ctr"/>
+            <a:lstStyle/>
+            <a:p>
+              <a:pPr algn="ctr"/>
+              <a:endParaRPr lang="id-ID"/>
+            </a:p>
+          </p:txBody>
+        </p:sp>
+        <p:sp>
+          <p:nvSpPr>
+            <p:cNvPr id="21" name="Rectangle 20"/>
+            <p:cNvSpPr/>
+            <p:nvPr/>
+          </p:nvSpPr>
+          <p:spPr>
+            <a:xfrm rot="16200000">
+              <a:off x="7044834" y="1161369"/>
+              <a:ext cx="134335" cy="2032000"/>
+            </a:xfrm>
+            <a:prstGeom prst="rect">
+              <a:avLst/>
+            </a:prstGeom>
+            <a:solidFill>
+              <a:schemeClr val="accent3">
+                <a:lumMod val="75000"/>
+              </a:schemeClr>
+            </a:solidFill>
+            <a:ln>
+              <a:noFill/>
+            </a:ln>
+          </p:spPr>
+          <p:style>
+            <a:lnRef idx="2">
+              <a:schemeClr val="accent1">
+                <a:shade val="50000"/>
+              </a:schemeClr>
+            </a:lnRef>
+            <a:fillRef idx="1">
+              <a:schemeClr val="accent1"/>
+            </a:fillRef>
+            <a:effectRef idx="0">
+              <a:schemeClr val="accent1"/>
+            </a:effectRef>
+            <a:fontRef idx="minor">
+              <a:schemeClr val="lt1"/>
+            </a:fontRef>
+          </p:style>
+          <p:txBody>
+            <a:bodyPr rtlCol="0" anchor="ctr"/>
+            <a:lstStyle/>
+            <a:p>
+              <a:pPr algn="ctr"/>
+              <a:endParaRPr lang="id-ID"/>
+            </a:p>
+          </p:txBody>
+        </p:sp>
+        <p:sp>
+          <p:nvSpPr>
+            <p:cNvPr id="22" name="Rectangle 21"/>
+            <p:cNvSpPr/>
+            <p:nvPr/>
+          </p:nvSpPr>
+          <p:spPr>
+            <a:xfrm rot="16200000">
+              <a:off x="9076834" y="1161367"/>
+              <a:ext cx="134336" cy="2032000"/>
+            </a:xfrm>
+            <a:prstGeom prst="rect">
+              <a:avLst/>
+            </a:prstGeom>
+            <a:solidFill>
+              <a:schemeClr val="accent4">
+                <a:lumMod val="75000"/>
+              </a:schemeClr>
+            </a:solidFill>
+            <a:ln>
+              <a:noFill/>
+            </a:ln>
+          </p:spPr>
+          <p:style>
+            <a:lnRef idx="2">
+              <a:schemeClr val="accent1">
+                <a:shade val="50000"/>
+              </a:schemeClr>
+            </a:lnRef>
+            <a:fillRef idx="1">
+              <a:schemeClr val="accent1"/>
+            </a:fillRef>
+            <a:effectRef idx="0">
+              <a:schemeClr val="accent1"/>
+            </a:effectRef>
+            <a:fontRef idx="minor">
+              <a:schemeClr val="lt1"/>
+            </a:fontRef>
+          </p:style>
+          <p:txBody>
+            <a:bodyPr rtlCol="0" anchor="ctr"/>
+            <a:lstStyle/>
+            <a:p>
+              <a:pPr algn="ctr"/>
+              <a:endParaRPr lang="id-ID"/>
+            </a:p>
+          </p:txBody>
+        </p:sp>
+        <p:sp>
+          <p:nvSpPr>
+            <p:cNvPr id="23" name="Rectangle 22"/>
+            <p:cNvSpPr/>
+            <p:nvPr/>
+          </p:nvSpPr>
+          <p:spPr>
+            <a:xfrm rot="16200000">
+              <a:off x="11108832" y="1161366"/>
+              <a:ext cx="134338" cy="2032000"/>
+            </a:xfrm>
+            <a:prstGeom prst="rect">
+              <a:avLst/>
+            </a:prstGeom>
+            <a:solidFill>
+              <a:schemeClr val="accent5">
+                <a:lumMod val="75000"/>
+              </a:schemeClr>
+            </a:solidFill>
+            <a:ln>
+              <a:noFill/>
+            </a:ln>
+          </p:spPr>
+          <p:style>
+            <a:lnRef idx="2">
+              <a:schemeClr val="accent1">
+                <a:shade val="50000"/>
+              </a:schemeClr>
+            </a:lnRef>
+            <a:fillRef idx="1">
+              <a:schemeClr val="accent1"/>
+            </a:fillRef>
+            <a:effectRef idx="0">
+              <a:schemeClr val="accent1"/>
+            </a:effectRef>
+            <a:fontRef idx="minor">
+              <a:schemeClr val="lt1"/>
+            </a:fontRef>
+          </p:style>
+          <p:txBody>
+            <a:bodyPr rtlCol="0" anchor="ctr"/>
+            <a:lstStyle/>
+            <a:p>
+              <a:pPr algn="ctr"/>
+              <a:endParaRPr lang="id-ID"/>
+            </a:p>
+          </p:txBody>
+        </p:sp>
+        <p:sp>
+          <p:nvSpPr>
+            <p:cNvPr id="24" name="Rectangle 23"/>
+            <p:cNvSpPr/>
+            <p:nvPr/>
+          </p:nvSpPr>
+          <p:spPr>
+            <a:xfrm rot="16200000">
+              <a:off x="948836" y="1161370"/>
+              <a:ext cx="134331" cy="2032000"/>
+            </a:xfrm>
+            <a:prstGeom prst="rect">
+              <a:avLst/>
+            </a:prstGeom>
+            <a:solidFill>
+              <a:schemeClr val="accent6">
+                <a:lumMod val="75000"/>
+              </a:schemeClr>
+            </a:solidFill>
+            <a:ln>
+              <a:noFill/>
+            </a:ln>
+          </p:spPr>
+          <p:style>
+            <a:lnRef idx="2">
+              <a:schemeClr val="accent1">
+                <a:shade val="50000"/>
+              </a:schemeClr>
+            </a:lnRef>
+            <a:fillRef idx="1">
+              <a:schemeClr val="accent1"/>
+            </a:fillRef>
+            <a:effectRef idx="0">
+              <a:schemeClr val="accent1"/>
+            </a:effectRef>
+            <a:fontRef idx="minor">
+              <a:schemeClr val="lt1"/>
+            </a:fontRef>
+          </p:style>
+          <p:txBody>
+            <a:bodyPr rtlCol="0" anchor="ctr"/>
+            <a:lstStyle/>
+            <a:p>
+              <a:pPr algn="ctr"/>
+              <a:endParaRPr lang="id-ID"/>
+            </a:p>
+          </p:txBody>
+        </p:sp>
+      </p:grpSp>
+      <p:cxnSp>
+        <p:nvCxnSpPr>
+          <p:cNvPr id="158" name="Straight Connector 157"/>
+          <p:cNvCxnSpPr/>
+          <p:nvPr/>
+        </p:nvCxnSpPr>
+        <p:spPr>
+          <a:xfrm>
+            <a:off x="7489635" y="2287098"/>
+            <a:ext cx="1530378" cy="0"/>
+          </a:xfrm>
+          <a:prstGeom prst="line">
+            <a:avLst/>
+          </a:prstGeom>
+          <a:ln w="38100">
+            <a:solidFill>
+              <a:schemeClr val="bg1">
+                <a:lumMod val="75000"/>
+              </a:schemeClr>
+            </a:solidFill>
+            <a:prstDash val="solid"/>
+            <a:headEnd type="triangle"/>
+            <a:tailEnd type="stealth"/>
+          </a:ln>
+        </p:spPr>
+        <p:style>
+          <a:lnRef idx="1">
+            <a:schemeClr val="accent1"/>
+          </a:lnRef>
+          <a:fillRef idx="0">
+            <a:schemeClr val="accent1"/>
+          </a:fillRef>
+          <a:effectRef idx="0">
+            <a:schemeClr val="accent1"/>
+          </a:effectRef>
+          <a:fontRef idx="minor">
+            <a:schemeClr val="tx1"/>
+          </a:fontRef>
+        </p:style>
+      </p:cxnSp>
+      <p:pic>
+        <p:nvPicPr>
+          <p:cNvPr id="218" name="Picture 217" descr="Compute_AWSLambda.png"/>
+          <p:cNvPicPr>
+            <a:picLocks noChangeAspect="1"/>
+          </p:cNvPicPr>
+          <p:nvPr/>
+        </p:nvPicPr>
+        <p:blipFill>
+          <a:blip r:embed="rId3">
+            <a:extLst>
+              <a:ext uri="{28A0092B-C50C-407E-A947-70E740481C1C}">
+                <a14:useLocalDpi xmlns:a14="http://schemas.microsoft.com/office/drawing/2010/main" val="0"/>
+              </a:ext>
+            </a:extLst>
+          </a:blip>
+          <a:stretch>
+            <a:fillRect/>
+          </a:stretch>
+        </p:blipFill>
+        <p:spPr>
+          <a:xfrm>
+            <a:off x="6669509" y="3576688"/>
+            <a:ext cx="700098" cy="834932"/>
+          </a:xfrm>
+          <a:prstGeom prst="rect">
+            <a:avLst/>
+          </a:prstGeom>
+        </p:spPr>
+      </p:pic>
+      <p:pic>
+        <p:nvPicPr>
+          <p:cNvPr id="219" name="Picture 218" descr="Compute_AWSLambda.png"/>
+          <p:cNvPicPr>
+            <a:picLocks noChangeAspect="1"/>
+          </p:cNvPicPr>
+          <p:nvPr/>
+        </p:nvPicPr>
+        <p:blipFill>
+          <a:blip r:embed="rId3">
+            <a:extLst>
+              <a:ext uri="{28A0092B-C50C-407E-A947-70E740481C1C}">
+                <a14:useLocalDpi xmlns:a14="http://schemas.microsoft.com/office/drawing/2010/main" val="0"/>
+              </a:ext>
+            </a:extLst>
+          </a:blip>
+          <a:stretch>
+            <a:fillRect/>
+          </a:stretch>
+        </p:blipFill>
+        <p:spPr>
+          <a:xfrm>
+            <a:off x="9319100" y="1924065"/>
+            <a:ext cx="700098" cy="834932"/>
+          </a:xfrm>
+          <a:prstGeom prst="rect">
+            <a:avLst/>
+          </a:prstGeom>
+        </p:spPr>
+      </p:pic>
+      <p:pic>
+        <p:nvPicPr>
+          <p:cNvPr id="8" name="Picture 7" descr="Application-Services_AmazonAPIGateway.png"/>
+          <p:cNvPicPr>
+            <a:picLocks noChangeAspect="1"/>
+          </p:cNvPicPr>
+          <p:nvPr/>
+        </p:nvPicPr>
+        <p:blipFill>
+          <a:blip r:embed="rId4">
+            <a:extLst>
+              <a:ext uri="{28A0092B-C50C-407E-A947-70E740481C1C}">
+                <a14:useLocalDpi xmlns:a14="http://schemas.microsoft.com/office/drawing/2010/main" val="0"/>
+              </a:ext>
+            </a:extLst>
+          </a:blip>
+          <a:stretch>
+            <a:fillRect/>
+          </a:stretch>
+        </p:blipFill>
+        <p:spPr>
+          <a:xfrm>
+            <a:off x="6723154" y="1541292"/>
+            <a:ext cx="700098" cy="834932"/>
+          </a:xfrm>
+          <a:prstGeom prst="rect">
+            <a:avLst/>
+          </a:prstGeom>
+        </p:spPr>
+      </p:pic>
+      <p:sp>
+        <p:nvSpPr>
+          <p:cNvPr id="222" name="TextBox 221"/>
+          <p:cNvSpPr txBox="1"/>
+          <p:nvPr/>
+        </p:nvSpPr>
+        <p:spPr>
+          <a:xfrm>
+            <a:off x="7521243" y="1761835"/>
+            <a:ext cx="1128963" cy="307777"/>
+          </a:xfrm>
+          <a:prstGeom prst="rect">
+            <a:avLst/>
+          </a:prstGeom>
+          <a:noFill/>
+        </p:spPr>
+        <p:txBody>
+          <a:bodyPr wrap="none" rtlCol="0">
+            <a:spAutoFit/>
+          </a:bodyPr>
+          <a:lstStyle/>
+          <a:p>
+            <a:pPr algn="ctr"/>
+            <a:r>
+              <a:rPr lang="id-ID" sz="1400" b="1" dirty="0" smtClean="0">
+                <a:solidFill>
+                  <a:schemeClr val="bg1"/>
+                </a:solidFill>
+                <a:latin typeface="Calibri" charset="0"/>
+                <a:ea typeface="Calibri" charset="0"/>
+                <a:cs typeface="Calibri" charset="0"/>
+              </a:rPr>
+              <a:t>API Gateway</a:t>
+            </a:r>
+            <a:endParaRPr lang="id-ID" sz="1400" b="1" dirty="0">
+              <a:solidFill>
+                <a:schemeClr val="bg1"/>
+              </a:solidFill>
+              <a:latin typeface="Calibri" charset="0"/>
+              <a:ea typeface="Calibri" charset="0"/>
+              <a:cs typeface="Calibri" charset="0"/>
+            </a:endParaRPr>
+          </a:p>
+        </p:txBody>
+      </p:sp>
+      <p:cxnSp>
+        <p:nvCxnSpPr>
+          <p:cNvPr id="223" name="Straight Connector 222"/>
+          <p:cNvCxnSpPr/>
+          <p:nvPr/>
+        </p:nvCxnSpPr>
+        <p:spPr>
+          <a:xfrm>
+            <a:off x="7073203" y="3054636"/>
+            <a:ext cx="0" cy="421736"/>
+          </a:xfrm>
+          <a:prstGeom prst="line">
+            <a:avLst/>
+          </a:prstGeom>
+          <a:ln w="38100">
+            <a:solidFill>
+              <a:schemeClr val="bg1">
+                <a:lumMod val="75000"/>
+              </a:schemeClr>
+            </a:solidFill>
+            <a:prstDash val="solid"/>
+            <a:tailEnd type="stealth"/>
+          </a:ln>
+        </p:spPr>
+        <p:style>
+          <a:lnRef idx="1">
+            <a:schemeClr val="accent1"/>
+          </a:lnRef>
+          <a:fillRef idx="0">
+            <a:schemeClr val="accent1"/>
+          </a:fillRef>
+          <a:effectRef idx="0">
+            <a:schemeClr val="accent1"/>
+          </a:effectRef>
+          <a:fontRef idx="minor">
+            <a:schemeClr val="tx1"/>
+          </a:fontRef>
+        </p:style>
+      </p:cxnSp>
+      <p:cxnSp>
+        <p:nvCxnSpPr>
+          <p:cNvPr id="225" name="Straight Connector 224"/>
+          <p:cNvCxnSpPr/>
+          <p:nvPr/>
+        </p:nvCxnSpPr>
+        <p:spPr>
+          <a:xfrm>
+            <a:off x="7073203" y="2500880"/>
+            <a:ext cx="2018" cy="623853"/>
+          </a:xfrm>
+          <a:prstGeom prst="line">
+            <a:avLst/>
+          </a:prstGeom>
+          <a:ln w="28575">
+            <a:solidFill>
+              <a:schemeClr val="bg1">
+                <a:lumMod val="75000"/>
+              </a:schemeClr>
+            </a:solidFill>
+            <a:prstDash val="solid"/>
+            <a:headEnd type="triangle"/>
+            <a:tailEnd type="none"/>
+          </a:ln>
+        </p:spPr>
+        <p:style>
+          <a:lnRef idx="1">
+            <a:schemeClr val="accent1"/>
+          </a:lnRef>
+          <a:fillRef idx="0">
+            <a:schemeClr val="accent1"/>
+          </a:fillRef>
+          <a:effectRef idx="0">
+            <a:schemeClr val="accent1"/>
+          </a:effectRef>
+          <a:fontRef idx="minor">
+            <a:schemeClr val="tx1"/>
+          </a:fontRef>
+        </p:style>
+      </p:cxnSp>
+      <p:grpSp>
+        <p:nvGrpSpPr>
+          <p:cNvPr id="76" name="Group 75"/>
+          <p:cNvGrpSpPr/>
+          <p:nvPr/>
+        </p:nvGrpSpPr>
+        <p:grpSpPr>
+          <a:xfrm>
+            <a:off x="2874216" y="1512776"/>
+            <a:ext cx="479416" cy="863449"/>
+            <a:chOff x="7296151" y="4556125"/>
+            <a:chExt cx="758824" cy="1330325"/>
+          </a:xfrm>
+        </p:grpSpPr>
+        <p:sp>
+          <p:nvSpPr>
+            <p:cNvPr id="77" name="Freeform 38"/>
+            <p:cNvSpPr>
+              <a:spLocks/>
+            </p:cNvSpPr>
+            <p:nvPr/>
+          </p:nvSpPr>
+          <p:spPr bwMode="auto">
+            <a:xfrm>
+              <a:off x="7296151" y="4556125"/>
+              <a:ext cx="758824" cy="1330325"/>
+            </a:xfrm>
+            <a:custGeom>
+              <a:avLst/>
+              <a:gdLst>
+                <a:gd name="T0" fmla="*/ 174 w 199"/>
+                <a:gd name="T1" fmla="*/ 0 h 352"/>
+                <a:gd name="T2" fmla="*/ 26 w 199"/>
+                <a:gd name="T3" fmla="*/ 0 h 352"/>
+                <a:gd name="T4" fmla="*/ 0 w 199"/>
+                <a:gd name="T5" fmla="*/ 26 h 352"/>
+                <a:gd name="T6" fmla="*/ 0 w 199"/>
+                <a:gd name="T7" fmla="*/ 327 h 352"/>
+                <a:gd name="T8" fmla="*/ 26 w 199"/>
+                <a:gd name="T9" fmla="*/ 352 h 352"/>
+                <a:gd name="T10" fmla="*/ 174 w 199"/>
+                <a:gd name="T11" fmla="*/ 352 h 352"/>
+                <a:gd name="T12" fmla="*/ 199 w 199"/>
+                <a:gd name="T13" fmla="*/ 327 h 352"/>
+                <a:gd name="T14" fmla="*/ 199 w 199"/>
+                <a:gd name="T15" fmla="*/ 26 h 352"/>
+                <a:gd name="T16" fmla="*/ 174 w 199"/>
+                <a:gd name="T17" fmla="*/ 0 h 352"/>
+              </a:gdLst>
+              <a:ahLst/>
+              <a:cxnLst>
+                <a:cxn ang="0">
+                  <a:pos x="T0" y="T1"/>
+                </a:cxn>
+                <a:cxn ang="0">
+                  <a:pos x="T2" y="T3"/>
+                </a:cxn>
+                <a:cxn ang="0">
+                  <a:pos x="T4" y="T5"/>
+                </a:cxn>
+                <a:cxn ang="0">
+                  <a:pos x="T6" y="T7"/>
+                </a:cxn>
+                <a:cxn ang="0">
+                  <a:pos x="T8" y="T9"/>
+                </a:cxn>
+                <a:cxn ang="0">
+                  <a:pos x="T10" y="T11"/>
+                </a:cxn>
+                <a:cxn ang="0">
+                  <a:pos x="T12" y="T13"/>
+                </a:cxn>
+                <a:cxn ang="0">
+                  <a:pos x="T14" y="T15"/>
+                </a:cxn>
+                <a:cxn ang="0">
+                  <a:pos x="T16" y="T17"/>
+                </a:cxn>
+              </a:cxnLst>
+              <a:rect l="0" t="0" r="r" b="b"/>
+              <a:pathLst>
+                <a:path w="199" h="352">
+                  <a:moveTo>
+                    <a:pt x="174" y="0"/>
+                  </a:moveTo>
+                  <a:cubicBezTo>
+                    <a:pt x="26" y="0"/>
+                    <a:pt x="26" y="0"/>
+                    <a:pt x="26" y="0"/>
+                  </a:cubicBezTo>
+                  <a:cubicBezTo>
+                    <a:pt x="11" y="0"/>
+                    <a:pt x="0" y="12"/>
+                    <a:pt x="0" y="26"/>
+                  </a:cubicBezTo>
+                  <a:cubicBezTo>
+                    <a:pt x="0" y="327"/>
+                    <a:pt x="0" y="327"/>
+                    <a:pt x="0" y="327"/>
+                  </a:cubicBezTo>
+                  <a:cubicBezTo>
+                    <a:pt x="0" y="341"/>
+                    <a:pt x="11" y="352"/>
+                    <a:pt x="26" y="352"/>
+                  </a:cubicBezTo>
+                  <a:cubicBezTo>
+                    <a:pt x="174" y="352"/>
+                    <a:pt x="174" y="352"/>
+                    <a:pt x="174" y="352"/>
+                  </a:cubicBezTo>
+                  <a:cubicBezTo>
+                    <a:pt x="188" y="352"/>
+                    <a:pt x="199" y="341"/>
+                    <a:pt x="199" y="327"/>
+                  </a:cubicBezTo>
+                  <a:cubicBezTo>
+                    <a:pt x="199" y="26"/>
+                    <a:pt x="199" y="26"/>
+                    <a:pt x="199" y="26"/>
+                  </a:cubicBezTo>
+                  <a:cubicBezTo>
+                    <a:pt x="199" y="12"/>
+                    <a:pt x="188" y="0"/>
+                    <a:pt x="174" y="0"/>
+                  </a:cubicBezTo>
+                  <a:close/>
+                </a:path>
+              </a:pathLst>
+            </a:custGeom>
+            <a:solidFill>
+              <a:schemeClr val="tx1">
+                <a:lumMod val="65000"/>
+                <a:lumOff val="35000"/>
+              </a:schemeClr>
+            </a:solidFill>
+            <a:ln>
+              <a:noFill/>
+            </a:ln>
+            <a:effectLst>
+              <a:outerShdw blurRad="127000" dir="13500000" sy="23000" kx="1200000" algn="br" rotWithShape="0">
+                <a:prstClr val="black">
+                  <a:alpha val="10000"/>
+                </a:prstClr>
+              </a:outerShdw>
+            </a:effectLst>
+          </p:spPr>
+          <p:txBody>
+            <a:bodyPr vert="horz" wrap="square" lIns="91440" tIns="45720" rIns="91440" bIns="45720" numCol="1" anchor="t" anchorCtr="0" compatLnSpc="1">
+              <a:prstTxWarp prst="textNoShape">
+                <a:avLst/>
+              </a:prstTxWarp>
+            </a:bodyPr>
+            <a:lstStyle/>
+            <a:p>
+              <a:endParaRPr lang="id-ID"/>
+            </a:p>
+          </p:txBody>
+        </p:sp>
+        <p:sp>
+          <p:nvSpPr>
+            <p:cNvPr id="78" name="Rectangle 39"/>
+            <p:cNvSpPr>
+              <a:spLocks noChangeArrowheads="1"/>
+            </p:cNvSpPr>
+            <p:nvPr/>
+          </p:nvSpPr>
+          <p:spPr bwMode="auto">
+            <a:xfrm>
+              <a:off x="7379223" y="4718050"/>
+              <a:ext cx="612775" cy="919163"/>
+            </a:xfrm>
+            <a:prstGeom prst="rect">
+              <a:avLst/>
+            </a:prstGeom>
+            <a:solidFill>
+              <a:schemeClr val="accent6"/>
+            </a:solidFill>
+            <a:ln>
+              <a:noFill/>
+            </a:ln>
+          </p:spPr>
+          <p:txBody>
+            <a:bodyPr vert="horz" wrap="square" lIns="91440" tIns="45720" rIns="91440" bIns="45720" numCol="1" anchor="t" anchorCtr="0" compatLnSpc="1">
+              <a:prstTxWarp prst="textNoShape">
+                <a:avLst/>
+              </a:prstTxWarp>
+            </a:bodyPr>
+            <a:lstStyle/>
+            <a:p>
+              <a:endParaRPr lang="id-ID"/>
+            </a:p>
+          </p:txBody>
+        </p:sp>
+        <p:sp>
+          <p:nvSpPr>
+            <p:cNvPr id="79" name="Freeform 40"/>
+            <p:cNvSpPr>
+              <a:spLocks/>
+            </p:cNvSpPr>
+            <p:nvPr/>
+          </p:nvSpPr>
+          <p:spPr bwMode="auto">
+            <a:xfrm>
+              <a:off x="7543800" y="4627563"/>
+              <a:ext cx="263525" cy="26988"/>
+            </a:xfrm>
+            <a:custGeom>
+              <a:avLst/>
+              <a:gdLst>
+                <a:gd name="T0" fmla="*/ 166 w 166"/>
+                <a:gd name="T1" fmla="*/ 17 h 17"/>
+                <a:gd name="T2" fmla="*/ 0 w 166"/>
+                <a:gd name="T3" fmla="*/ 17 h 17"/>
+                <a:gd name="T4" fmla="*/ 0 w 166"/>
+                <a:gd name="T5" fmla="*/ 0 h 17"/>
+                <a:gd name="T6" fmla="*/ 166 w 166"/>
+                <a:gd name="T7" fmla="*/ 0 h 17"/>
+                <a:gd name="T8" fmla="*/ 166 w 166"/>
+                <a:gd name="T9" fmla="*/ 17 h 17"/>
+                <a:gd name="T10" fmla="*/ 166 w 166"/>
+                <a:gd name="T11" fmla="*/ 17 h 17"/>
+              </a:gdLst>
+              <a:ahLst/>
+              <a:cxnLst>
+                <a:cxn ang="0">
+                  <a:pos x="T0" y="T1"/>
+                </a:cxn>
+                <a:cxn ang="0">
+                  <a:pos x="T2" y="T3"/>
+                </a:cxn>
+                <a:cxn ang="0">
+                  <a:pos x="T4" y="T5"/>
+                </a:cxn>
+                <a:cxn ang="0">
+                  <a:pos x="T6" y="T7"/>
+                </a:cxn>
+                <a:cxn ang="0">
+                  <a:pos x="T8" y="T9"/>
+                </a:cxn>
+                <a:cxn ang="0">
+                  <a:pos x="T10" y="T11"/>
+                </a:cxn>
+              </a:cxnLst>
+              <a:rect l="0" t="0" r="r" b="b"/>
+              <a:pathLst>
+                <a:path w="166" h="17">
+                  <a:moveTo>
+                    <a:pt x="166" y="17"/>
+                  </a:moveTo>
+                  <a:lnTo>
+                    <a:pt x="0" y="17"/>
+                  </a:lnTo>
+                  <a:lnTo>
+                    <a:pt x="0" y="0"/>
+                  </a:lnTo>
+                  <a:lnTo>
+                    <a:pt x="166" y="0"/>
+                  </a:lnTo>
+                  <a:lnTo>
+                    <a:pt x="166" y="17"/>
+                  </a:lnTo>
+                  <a:lnTo>
+                    <a:pt x="166" y="17"/>
+                  </a:lnTo>
+                  <a:close/>
+                </a:path>
+              </a:pathLst>
+            </a:custGeom>
+            <a:solidFill>
+              <a:srgbClr val="FFFFFF"/>
+            </a:solidFill>
+            <a:ln>
+              <a:noFill/>
+            </a:ln>
+            <a:extLst>
+              <a:ext uri="{91240B29-F687-4f45-9708-019B960494DF}">
+                <a14:hiddenLine xmlns:a14="http://schemas.microsoft.com/office/drawing/2010/main" xmlns="" w="9525">
+                  <a:solidFill>
+                    <a:srgbClr val="000000"/>
+                  </a:solidFill>
+                  <a:round/>
+                  <a:headEnd/>
+                  <a:tailEnd/>
+                </a14:hiddenLine>
+              </a:ext>
+            </a:extLst>
+          </p:spPr>
+          <p:txBody>
+            <a:bodyPr vert="horz" wrap="square" lIns="91440" tIns="45720" rIns="91440" bIns="45720" numCol="1" anchor="t" anchorCtr="0" compatLnSpc="1">
+              <a:prstTxWarp prst="textNoShape">
+                <a:avLst/>
+              </a:prstTxWarp>
+            </a:bodyPr>
+            <a:lstStyle/>
+            <a:p>
+              <a:endParaRPr lang="id-ID"/>
+            </a:p>
+          </p:txBody>
+        </p:sp>
+        <p:sp>
+          <p:nvSpPr>
+            <p:cNvPr id="80" name="Oval 41"/>
+            <p:cNvSpPr>
+              <a:spLocks noChangeArrowheads="1"/>
+            </p:cNvSpPr>
+            <p:nvPr/>
+          </p:nvSpPr>
+          <p:spPr bwMode="auto">
+            <a:xfrm>
+              <a:off x="7867650" y="4616450"/>
+              <a:ext cx="50800" cy="49213"/>
+            </a:xfrm>
+            <a:prstGeom prst="ellipse">
+              <a:avLst/>
+            </a:prstGeom>
+            <a:solidFill>
+              <a:srgbClr val="FFFFFF"/>
+            </a:solidFill>
+            <a:ln>
+              <a:noFill/>
+            </a:ln>
+            <a:extLst>
+              <a:ext uri="{91240B29-F687-4f45-9708-019B960494DF}">
+                <a14:hiddenLine xmlns:a14="http://schemas.microsoft.com/office/drawing/2010/main" xmlns="" w="9525">
+                  <a:solidFill>
+                    <a:srgbClr val="000000"/>
+                  </a:solidFill>
+                  <a:round/>
+                  <a:headEnd/>
+                  <a:tailEnd/>
+                </a14:hiddenLine>
+              </a:ext>
+            </a:extLst>
+          </p:spPr>
+          <p:txBody>
+            <a:bodyPr vert="horz" wrap="square" lIns="91440" tIns="45720" rIns="91440" bIns="45720" numCol="1" anchor="t" anchorCtr="0" compatLnSpc="1">
+              <a:prstTxWarp prst="textNoShape">
+                <a:avLst/>
+              </a:prstTxWarp>
+            </a:bodyPr>
+            <a:lstStyle/>
+            <a:p>
+              <a:endParaRPr lang="id-ID"/>
+            </a:p>
+          </p:txBody>
+        </p:sp>
+        <p:sp>
+          <p:nvSpPr>
+            <p:cNvPr id="81" name="Rectangle 42"/>
+            <p:cNvSpPr>
+              <a:spLocks noChangeArrowheads="1"/>
+            </p:cNvSpPr>
+            <p:nvPr/>
+          </p:nvSpPr>
+          <p:spPr bwMode="auto">
+            <a:xfrm>
+              <a:off x="7556500" y="5713413"/>
+              <a:ext cx="239712" cy="71438"/>
+            </a:xfrm>
+            <a:prstGeom prst="rect">
+              <a:avLst/>
+            </a:prstGeom>
+            <a:solidFill>
+              <a:srgbClr val="FFFFFF"/>
+            </a:solidFill>
+            <a:ln>
+              <a:noFill/>
+            </a:ln>
+            <a:extLst>
+              <a:ext uri="{91240B29-F687-4f45-9708-019B960494DF}">
+                <a14:hiddenLine xmlns:a14="http://schemas.microsoft.com/office/drawing/2010/main" xmlns="" w="9525">
+                  <a:solidFill>
+                    <a:srgbClr val="000000"/>
+                  </a:solidFill>
+                  <a:miter lim="800000"/>
+                  <a:headEnd/>
+                  <a:tailEnd/>
+                </a14:hiddenLine>
+              </a:ext>
+            </a:extLst>
+          </p:spPr>
+          <p:txBody>
+            <a:bodyPr vert="horz" wrap="square" lIns="91440" tIns="45720" rIns="91440" bIns="45720" numCol="1" anchor="t" anchorCtr="0" compatLnSpc="1">
+              <a:prstTxWarp prst="textNoShape">
+                <a:avLst/>
+              </a:prstTxWarp>
+            </a:bodyPr>
+            <a:lstStyle/>
+            <a:p>
+              <a:endParaRPr lang="id-ID"/>
+            </a:p>
+          </p:txBody>
+        </p:sp>
+      </p:grpSp>
+      <p:grpSp>
+        <p:nvGrpSpPr>
+          <p:cNvPr id="82" name="Group 81"/>
+          <p:cNvGrpSpPr/>
+          <p:nvPr/>
+        </p:nvGrpSpPr>
+        <p:grpSpPr>
+          <a:xfrm>
+            <a:off x="1262429" y="1504970"/>
+            <a:ext cx="1384981" cy="1098964"/>
+            <a:chOff x="5499100" y="144463"/>
+            <a:chExt cx="3213100" cy="2614612"/>
+          </a:xfrm>
+          <a:effectLst>
+            <a:outerShdw blurRad="127000" dir="13500000" sy="23000" kx="1200000" algn="br" rotWithShape="0">
+              <a:prstClr val="black">
+                <a:alpha val="10000"/>
+              </a:prstClr>
+            </a:outerShdw>
+          </a:effectLst>
+        </p:grpSpPr>
+        <p:sp>
+          <p:nvSpPr>
+            <p:cNvPr id="83" name="Freeform 28"/>
+            <p:cNvSpPr>
+              <a:spLocks/>
+            </p:cNvSpPr>
+            <p:nvPr/>
+          </p:nvSpPr>
+          <p:spPr bwMode="auto">
+            <a:xfrm>
+              <a:off x="5499100" y="144463"/>
+              <a:ext cx="3213100" cy="1944687"/>
+            </a:xfrm>
+            <a:custGeom>
+              <a:avLst/>
+              <a:gdLst>
+                <a:gd name="T0" fmla="*/ 0 w 854"/>
+                <a:gd name="T1" fmla="*/ 516 h 516"/>
+                <a:gd name="T2" fmla="*/ 0 w 854"/>
+                <a:gd name="T3" fmla="*/ 19 h 516"/>
+                <a:gd name="T4" fmla="*/ 20 w 854"/>
+                <a:gd name="T5" fmla="*/ 0 h 516"/>
+                <a:gd name="T6" fmla="*/ 835 w 854"/>
+                <a:gd name="T7" fmla="*/ 0 h 516"/>
+                <a:gd name="T8" fmla="*/ 854 w 854"/>
+                <a:gd name="T9" fmla="*/ 19 h 516"/>
+                <a:gd name="T10" fmla="*/ 854 w 854"/>
+                <a:gd name="T11" fmla="*/ 516 h 516"/>
+                <a:gd name="T12" fmla="*/ 0 w 854"/>
+                <a:gd name="T13" fmla="*/ 516 h 516"/>
+              </a:gdLst>
+              <a:ahLst/>
+              <a:cxnLst>
+                <a:cxn ang="0">
+                  <a:pos x="T0" y="T1"/>
+                </a:cxn>
+                <a:cxn ang="0">
+                  <a:pos x="T2" y="T3"/>
+                </a:cxn>
+                <a:cxn ang="0">
+                  <a:pos x="T4" y="T5"/>
+                </a:cxn>
+                <a:cxn ang="0">
+                  <a:pos x="T6" y="T7"/>
+                </a:cxn>
+                <a:cxn ang="0">
+                  <a:pos x="T8" y="T9"/>
+                </a:cxn>
+                <a:cxn ang="0">
+                  <a:pos x="T10" y="T11"/>
+                </a:cxn>
+                <a:cxn ang="0">
+                  <a:pos x="T12" y="T13"/>
+                </a:cxn>
+              </a:cxnLst>
+              <a:rect l="0" t="0" r="r" b="b"/>
+              <a:pathLst>
+                <a:path w="854" h="516">
+                  <a:moveTo>
+                    <a:pt x="0" y="516"/>
+                  </a:moveTo>
+                  <a:cubicBezTo>
+                    <a:pt x="0" y="19"/>
+                    <a:pt x="0" y="19"/>
+                    <a:pt x="0" y="19"/>
+                  </a:cubicBezTo>
+                  <a:cubicBezTo>
+                    <a:pt x="0" y="8"/>
+                    <a:pt x="9" y="0"/>
+                    <a:pt x="20" y="0"/>
+                  </a:cubicBezTo>
+                  <a:cubicBezTo>
+                    <a:pt x="835" y="0"/>
+                    <a:pt x="835" y="0"/>
+                    <a:pt x="835" y="0"/>
+                  </a:cubicBezTo>
+                  <a:cubicBezTo>
+                    <a:pt x="845" y="0"/>
+                    <a:pt x="854" y="8"/>
+                    <a:pt x="854" y="19"/>
+                  </a:cubicBezTo>
+                  <a:cubicBezTo>
+                    <a:pt x="854" y="516"/>
+                    <a:pt x="854" y="516"/>
+                    <a:pt x="854" y="516"/>
+                  </a:cubicBezTo>
+                  <a:lnTo>
+                    <a:pt x="0" y="516"/>
+                  </a:lnTo>
+                  <a:close/>
+                </a:path>
+              </a:pathLst>
+            </a:custGeom>
+            <a:solidFill>
+              <a:schemeClr val="bg1">
+                <a:lumMod val="85000"/>
+              </a:schemeClr>
+            </a:solidFill>
+            <a:ln>
+              <a:noFill/>
+            </a:ln>
+            <a:extLst>
+              <a:ext uri="{91240B29-F687-4f45-9708-019B960494DF}">
+                <a14:hiddenLine xmlns:a14="http://schemas.microsoft.com/office/drawing/2010/main" xmlns="" w="9525">
+                  <a:solidFill>
+                    <a:srgbClr val="000000"/>
+                  </a:solidFill>
+                  <a:round/>
+                  <a:headEnd/>
+                  <a:tailEnd/>
+                </a14:hiddenLine>
+              </a:ext>
+            </a:extLst>
+          </p:spPr>
+          <p:txBody>
+            <a:bodyPr vert="horz" wrap="square" lIns="91440" tIns="45720" rIns="91440" bIns="45720" numCol="1" anchor="t" anchorCtr="0" compatLnSpc="1">
+              <a:prstTxWarp prst="textNoShape">
+                <a:avLst/>
+              </a:prstTxWarp>
+            </a:bodyPr>
+            <a:lstStyle/>
+            <a:p>
+              <a:endParaRPr lang="id-ID"/>
+            </a:p>
+          </p:txBody>
+        </p:sp>
+        <p:sp>
+          <p:nvSpPr>
+            <p:cNvPr id="84" name="Freeform 29"/>
+            <p:cNvSpPr>
+              <a:spLocks/>
+            </p:cNvSpPr>
+            <p:nvPr/>
+          </p:nvSpPr>
+          <p:spPr bwMode="auto">
+            <a:xfrm>
+              <a:off x="5499100" y="2089150"/>
+              <a:ext cx="3213100" cy="290512"/>
+            </a:xfrm>
+            <a:custGeom>
+              <a:avLst/>
+              <a:gdLst>
+                <a:gd name="T0" fmla="*/ 835 w 854"/>
+                <a:gd name="T1" fmla="*/ 77 h 77"/>
+                <a:gd name="T2" fmla="*/ 20 w 854"/>
+                <a:gd name="T3" fmla="*/ 77 h 77"/>
+                <a:gd name="T4" fmla="*/ 0 w 854"/>
+                <a:gd name="T5" fmla="*/ 58 h 77"/>
+                <a:gd name="T6" fmla="*/ 0 w 854"/>
+                <a:gd name="T7" fmla="*/ 0 h 77"/>
+                <a:gd name="T8" fmla="*/ 854 w 854"/>
+                <a:gd name="T9" fmla="*/ 0 h 77"/>
+                <a:gd name="T10" fmla="*/ 854 w 854"/>
+                <a:gd name="T11" fmla="*/ 58 h 77"/>
+                <a:gd name="T12" fmla="*/ 835 w 854"/>
+                <a:gd name="T13" fmla="*/ 77 h 77"/>
+              </a:gdLst>
+              <a:ahLst/>
+              <a:cxnLst>
+                <a:cxn ang="0">
+                  <a:pos x="T0" y="T1"/>
+                </a:cxn>
+                <a:cxn ang="0">
+                  <a:pos x="T2" y="T3"/>
+                </a:cxn>
+                <a:cxn ang="0">
+                  <a:pos x="T4" y="T5"/>
+                </a:cxn>
+                <a:cxn ang="0">
+                  <a:pos x="T6" y="T7"/>
+                </a:cxn>
+                <a:cxn ang="0">
+                  <a:pos x="T8" y="T9"/>
+                </a:cxn>
+                <a:cxn ang="0">
+                  <a:pos x="T10" y="T11"/>
+                </a:cxn>
+                <a:cxn ang="0">
+                  <a:pos x="T12" y="T13"/>
+                </a:cxn>
+              </a:cxnLst>
+              <a:rect l="0" t="0" r="r" b="b"/>
+              <a:pathLst>
+                <a:path w="854" h="77">
+                  <a:moveTo>
+                    <a:pt x="835" y="77"/>
+                  </a:moveTo>
+                  <a:cubicBezTo>
+                    <a:pt x="20" y="77"/>
+                    <a:pt x="20" y="77"/>
+                    <a:pt x="20" y="77"/>
+                  </a:cubicBezTo>
+                  <a:cubicBezTo>
+                    <a:pt x="9" y="77"/>
+                    <a:pt x="0" y="69"/>
+                    <a:pt x="0" y="58"/>
+                  </a:cubicBezTo>
+                  <a:cubicBezTo>
+                    <a:pt x="0" y="0"/>
+                    <a:pt x="0" y="0"/>
+                    <a:pt x="0" y="0"/>
+                  </a:cubicBezTo>
+                  <a:cubicBezTo>
+                    <a:pt x="854" y="0"/>
+                    <a:pt x="854" y="0"/>
+                    <a:pt x="854" y="0"/>
+                  </a:cubicBezTo>
+                  <a:cubicBezTo>
+                    <a:pt x="854" y="58"/>
+                    <a:pt x="854" y="58"/>
+                    <a:pt x="854" y="58"/>
+                  </a:cubicBezTo>
+                  <a:cubicBezTo>
+                    <a:pt x="854" y="69"/>
+                    <a:pt x="845" y="77"/>
+                    <a:pt x="835" y="77"/>
+                  </a:cubicBezTo>
+                </a:path>
+              </a:pathLst>
+            </a:custGeom>
+            <a:solidFill>
+              <a:schemeClr val="bg1">
+                <a:lumMod val="95000"/>
+              </a:schemeClr>
+            </a:solidFill>
+            <a:ln>
+              <a:noFill/>
+            </a:ln>
+          </p:spPr>
+          <p:txBody>
+            <a:bodyPr vert="horz" wrap="square" lIns="91440" tIns="45720" rIns="91440" bIns="45720" numCol="1" anchor="t" anchorCtr="0" compatLnSpc="1">
+              <a:prstTxWarp prst="textNoShape">
+                <a:avLst/>
+              </a:prstTxWarp>
+            </a:bodyPr>
+            <a:lstStyle/>
+            <a:p>
+              <a:endParaRPr lang="id-ID"/>
+            </a:p>
+          </p:txBody>
+        </p:sp>
+        <p:sp>
+          <p:nvSpPr>
+            <p:cNvPr id="85" name="Freeform 30"/>
+            <p:cNvSpPr>
+              <a:spLocks/>
+            </p:cNvSpPr>
+            <p:nvPr/>
+          </p:nvSpPr>
+          <p:spPr bwMode="auto">
+            <a:xfrm>
+              <a:off x="6594475" y="2371725"/>
+              <a:ext cx="1076325" cy="387350"/>
+            </a:xfrm>
+            <a:custGeom>
+              <a:avLst/>
+              <a:gdLst>
+                <a:gd name="T0" fmla="*/ 0 w 678"/>
+                <a:gd name="T1" fmla="*/ 244 h 244"/>
+                <a:gd name="T2" fmla="*/ 0 w 678"/>
+                <a:gd name="T3" fmla="*/ 218 h 244"/>
+                <a:gd name="T4" fmla="*/ 80 w 678"/>
+                <a:gd name="T5" fmla="*/ 209 h 244"/>
+                <a:gd name="T6" fmla="*/ 135 w 678"/>
+                <a:gd name="T7" fmla="*/ 0 h 244"/>
+                <a:gd name="T8" fmla="*/ 543 w 678"/>
+                <a:gd name="T9" fmla="*/ 0 h 244"/>
+                <a:gd name="T10" fmla="*/ 599 w 678"/>
+                <a:gd name="T11" fmla="*/ 209 h 244"/>
+                <a:gd name="T12" fmla="*/ 678 w 678"/>
+                <a:gd name="T13" fmla="*/ 218 h 244"/>
+                <a:gd name="T14" fmla="*/ 678 w 678"/>
+                <a:gd name="T15" fmla="*/ 244 h 244"/>
+                <a:gd name="T16" fmla="*/ 0 w 678"/>
+                <a:gd name="T17" fmla="*/ 244 h 244"/>
+              </a:gdLst>
+              <a:ahLst/>
+              <a:cxnLst>
+                <a:cxn ang="0">
+                  <a:pos x="T0" y="T1"/>
+                </a:cxn>
+                <a:cxn ang="0">
+                  <a:pos x="T2" y="T3"/>
+                </a:cxn>
+                <a:cxn ang="0">
+                  <a:pos x="T4" y="T5"/>
+                </a:cxn>
+                <a:cxn ang="0">
+                  <a:pos x="T6" y="T7"/>
+                </a:cxn>
+                <a:cxn ang="0">
+                  <a:pos x="T8" y="T9"/>
+                </a:cxn>
+                <a:cxn ang="0">
+                  <a:pos x="T10" y="T11"/>
+                </a:cxn>
+                <a:cxn ang="0">
+                  <a:pos x="T12" y="T13"/>
+                </a:cxn>
+                <a:cxn ang="0">
+                  <a:pos x="T14" y="T15"/>
+                </a:cxn>
+                <a:cxn ang="0">
+                  <a:pos x="T16" y="T17"/>
+                </a:cxn>
+              </a:cxnLst>
+              <a:rect l="0" t="0" r="r" b="b"/>
+              <a:pathLst>
+                <a:path w="678" h="244">
+                  <a:moveTo>
+                    <a:pt x="0" y="244"/>
+                  </a:moveTo>
+                  <a:lnTo>
+                    <a:pt x="0" y="218"/>
+                  </a:lnTo>
+                  <a:lnTo>
+                    <a:pt x="80" y="209"/>
+                  </a:lnTo>
+                  <a:lnTo>
+                    <a:pt x="135" y="0"/>
+                  </a:lnTo>
+                  <a:lnTo>
+                    <a:pt x="543" y="0"/>
+                  </a:lnTo>
+                  <a:lnTo>
+                    <a:pt x="599" y="209"/>
+                  </a:lnTo>
+                  <a:lnTo>
+                    <a:pt x="678" y="218"/>
+                  </a:lnTo>
+                  <a:lnTo>
+                    <a:pt x="678" y="244"/>
+                  </a:lnTo>
+                  <a:lnTo>
+                    <a:pt x="0" y="244"/>
+                  </a:lnTo>
+                  <a:close/>
+                </a:path>
+              </a:pathLst>
+            </a:custGeom>
+            <a:solidFill>
+              <a:schemeClr val="bg1">
+                <a:lumMod val="95000"/>
+              </a:schemeClr>
+            </a:solidFill>
+            <a:ln>
+              <a:noFill/>
+            </a:ln>
+          </p:spPr>
+          <p:txBody>
+            <a:bodyPr vert="horz" wrap="square" lIns="91440" tIns="45720" rIns="91440" bIns="45720" numCol="1" anchor="t" anchorCtr="0" compatLnSpc="1">
+              <a:prstTxWarp prst="textNoShape">
+                <a:avLst/>
+              </a:prstTxWarp>
+            </a:bodyPr>
+            <a:lstStyle/>
+            <a:p>
+              <a:endParaRPr lang="id-ID"/>
+            </a:p>
+          </p:txBody>
+        </p:sp>
+        <p:sp>
+          <p:nvSpPr>
+            <p:cNvPr id="86" name="Freeform 31"/>
+            <p:cNvSpPr>
+              <a:spLocks/>
+            </p:cNvSpPr>
+            <p:nvPr/>
+          </p:nvSpPr>
+          <p:spPr bwMode="auto">
+            <a:xfrm>
+              <a:off x="6594475" y="2371725"/>
+              <a:ext cx="1076325" cy="387350"/>
+            </a:xfrm>
+            <a:custGeom>
+              <a:avLst/>
+              <a:gdLst>
+                <a:gd name="T0" fmla="*/ 0 w 678"/>
+                <a:gd name="T1" fmla="*/ 244 h 244"/>
+                <a:gd name="T2" fmla="*/ 0 w 678"/>
+                <a:gd name="T3" fmla="*/ 218 h 244"/>
+                <a:gd name="T4" fmla="*/ 80 w 678"/>
+                <a:gd name="T5" fmla="*/ 209 h 244"/>
+                <a:gd name="T6" fmla="*/ 135 w 678"/>
+                <a:gd name="T7" fmla="*/ 0 h 244"/>
+                <a:gd name="T8" fmla="*/ 543 w 678"/>
+                <a:gd name="T9" fmla="*/ 0 h 244"/>
+                <a:gd name="T10" fmla="*/ 599 w 678"/>
+                <a:gd name="T11" fmla="*/ 209 h 244"/>
+                <a:gd name="T12" fmla="*/ 678 w 678"/>
+                <a:gd name="T13" fmla="*/ 218 h 244"/>
+                <a:gd name="T14" fmla="*/ 678 w 678"/>
+                <a:gd name="T15" fmla="*/ 244 h 244"/>
+                <a:gd name="T16" fmla="*/ 0 w 678"/>
+                <a:gd name="T17" fmla="*/ 244 h 244"/>
+              </a:gdLst>
+              <a:ahLst/>
+              <a:cxnLst>
+                <a:cxn ang="0">
+                  <a:pos x="T0" y="T1"/>
+                </a:cxn>
+                <a:cxn ang="0">
+                  <a:pos x="T2" y="T3"/>
+                </a:cxn>
+                <a:cxn ang="0">
+                  <a:pos x="T4" y="T5"/>
+                </a:cxn>
+                <a:cxn ang="0">
+                  <a:pos x="T6" y="T7"/>
+                </a:cxn>
+                <a:cxn ang="0">
+                  <a:pos x="T8" y="T9"/>
+                </a:cxn>
+                <a:cxn ang="0">
+                  <a:pos x="T10" y="T11"/>
+                </a:cxn>
+                <a:cxn ang="0">
+                  <a:pos x="T12" y="T13"/>
+                </a:cxn>
+                <a:cxn ang="0">
+                  <a:pos x="T14" y="T15"/>
+                </a:cxn>
+                <a:cxn ang="0">
+                  <a:pos x="T16" y="T17"/>
+                </a:cxn>
+              </a:cxnLst>
+              <a:rect l="0" t="0" r="r" b="b"/>
+              <a:pathLst>
+                <a:path w="678" h="244">
+                  <a:moveTo>
+                    <a:pt x="0" y="244"/>
+                  </a:moveTo>
+                  <a:lnTo>
+                    <a:pt x="0" y="218"/>
+                  </a:lnTo>
+                  <a:lnTo>
+                    <a:pt x="80" y="209"/>
+                  </a:lnTo>
+                  <a:lnTo>
+                    <a:pt x="135" y="0"/>
+                  </a:lnTo>
+                  <a:lnTo>
+                    <a:pt x="543" y="0"/>
+                  </a:lnTo>
+                  <a:lnTo>
+                    <a:pt x="599" y="209"/>
+                  </a:lnTo>
+                  <a:lnTo>
+                    <a:pt x="678" y="218"/>
+                  </a:lnTo>
+                  <a:lnTo>
+                    <a:pt x="678" y="244"/>
+                  </a:lnTo>
+                  <a:lnTo>
+                    <a:pt x="0" y="244"/>
+                  </a:lnTo>
+                </a:path>
+              </a:pathLst>
+            </a:custGeom>
+            <a:noFill/>
+            <a:ln>
+              <a:noFill/>
+            </a:ln>
+            <a:extLst>
+              <a:ext uri="{909E8E84-426E-40dd-AFC4-6F175D3DCCD1}">
+                <a14:hiddenFill xmlns:a14="http://schemas.microsoft.com/office/drawing/2010/main" xmlns="">
+                  <a:solidFill>
+                    <a:srgbClr val="FFFFFF"/>
+                  </a:solidFill>
+                </a14:hiddenFill>
+              </a:ext>
+              <a:ext uri="{91240B29-F687-4f45-9708-019B960494DF}">
+                <a14:hiddenLine xmlns:a14="http://schemas.microsoft.com/office/drawing/2010/main" xmlns="" w="9525">
+                  <a:solidFill>
+                    <a:srgbClr val="000000"/>
+                  </a:solidFill>
+                  <a:round/>
+                  <a:headEnd/>
+                  <a:tailEnd/>
+                </a14:hiddenLine>
+              </a:ext>
+            </a:extLst>
+          </p:spPr>
+          <p:txBody>
+            <a:bodyPr vert="horz" wrap="square" lIns="91440" tIns="45720" rIns="91440" bIns="45720" numCol="1" anchor="t" anchorCtr="0" compatLnSpc="1">
+              <a:prstTxWarp prst="textNoShape">
+                <a:avLst/>
+              </a:prstTxWarp>
+            </a:bodyPr>
+            <a:lstStyle/>
+            <a:p>
+              <a:endParaRPr lang="id-ID"/>
+            </a:p>
+          </p:txBody>
+        </p:sp>
+        <p:sp>
+          <p:nvSpPr>
+            <p:cNvPr id="87" name="Rectangle 32"/>
+            <p:cNvSpPr>
+              <a:spLocks noChangeArrowheads="1"/>
+            </p:cNvSpPr>
+            <p:nvPr/>
+          </p:nvSpPr>
+          <p:spPr bwMode="auto">
+            <a:xfrm>
+              <a:off x="5600700" y="268288"/>
+              <a:ext cx="3009900" cy="1695450"/>
+            </a:xfrm>
+            <a:prstGeom prst="rect">
+              <a:avLst/>
+            </a:prstGeom>
+            <a:solidFill>
+              <a:schemeClr val="accent6"/>
+            </a:solidFill>
+            <a:ln>
+              <a:noFill/>
+            </a:ln>
+            <a:extLst>
+              <a:ext uri="{91240B29-F687-4f45-9708-019B960494DF}">
+                <a14:hiddenLine xmlns:a14="http://schemas.microsoft.com/office/drawing/2010/main" xmlns="" w="9525">
+                  <a:solidFill>
+                    <a:srgbClr val="000000"/>
+                  </a:solidFill>
+                  <a:miter lim="800000"/>
+                  <a:headEnd/>
+                  <a:tailEnd/>
+                </a14:hiddenLine>
+              </a:ext>
+            </a:extLst>
+          </p:spPr>
+          <p:txBody>
+            <a:bodyPr vert="horz" wrap="square" lIns="91440" tIns="45720" rIns="91440" bIns="45720" numCol="1" anchor="t" anchorCtr="0" compatLnSpc="1">
+              <a:prstTxWarp prst="textNoShape">
+                <a:avLst/>
+              </a:prstTxWarp>
+            </a:bodyPr>
+            <a:lstStyle/>
+            <a:p>
+              <a:endParaRPr lang="id-ID"/>
+            </a:p>
+          </p:txBody>
+        </p:sp>
+        <p:sp>
+          <p:nvSpPr>
+            <p:cNvPr id="88" name="Freeform 33"/>
+            <p:cNvSpPr>
+              <a:spLocks/>
+            </p:cNvSpPr>
+            <p:nvPr/>
+          </p:nvSpPr>
+          <p:spPr bwMode="auto">
+            <a:xfrm>
+              <a:off x="6797675" y="2371725"/>
+              <a:ext cx="673100" cy="60325"/>
+            </a:xfrm>
+            <a:custGeom>
+              <a:avLst/>
+              <a:gdLst>
+                <a:gd name="T0" fmla="*/ 415 w 424"/>
+                <a:gd name="T1" fmla="*/ 0 h 38"/>
+                <a:gd name="T2" fmla="*/ 7 w 424"/>
+                <a:gd name="T3" fmla="*/ 0 h 38"/>
+                <a:gd name="T4" fmla="*/ 0 w 424"/>
+                <a:gd name="T5" fmla="*/ 38 h 38"/>
+                <a:gd name="T6" fmla="*/ 424 w 424"/>
+                <a:gd name="T7" fmla="*/ 38 h 38"/>
+                <a:gd name="T8" fmla="*/ 415 w 424"/>
+                <a:gd name="T9" fmla="*/ 0 h 38"/>
+              </a:gdLst>
+              <a:ahLst/>
+              <a:cxnLst>
+                <a:cxn ang="0">
+                  <a:pos x="T0" y="T1"/>
+                </a:cxn>
+                <a:cxn ang="0">
+                  <a:pos x="T2" y="T3"/>
+                </a:cxn>
+                <a:cxn ang="0">
+                  <a:pos x="T4" y="T5"/>
+                </a:cxn>
+                <a:cxn ang="0">
+                  <a:pos x="T6" y="T7"/>
+                </a:cxn>
+                <a:cxn ang="0">
+                  <a:pos x="T8" y="T9"/>
+                </a:cxn>
+              </a:cxnLst>
+              <a:rect l="0" t="0" r="r" b="b"/>
+              <a:pathLst>
+                <a:path w="424" h="38">
+                  <a:moveTo>
+                    <a:pt x="415" y="0"/>
+                  </a:moveTo>
+                  <a:lnTo>
+                    <a:pt x="7" y="0"/>
+                  </a:lnTo>
+                  <a:lnTo>
+                    <a:pt x="0" y="38"/>
+                  </a:lnTo>
+                  <a:lnTo>
+                    <a:pt x="424" y="38"/>
+                  </a:lnTo>
+                  <a:lnTo>
+                    <a:pt x="415" y="0"/>
+                  </a:lnTo>
+                  <a:close/>
+                </a:path>
+              </a:pathLst>
+            </a:custGeom>
+            <a:solidFill>
+              <a:schemeClr val="tx1">
+                <a:alpha val="5000"/>
+              </a:schemeClr>
+            </a:solidFill>
+            <a:ln>
+              <a:noFill/>
+            </a:ln>
+          </p:spPr>
+          <p:txBody>
+            <a:bodyPr vert="horz" wrap="square" lIns="91440" tIns="45720" rIns="91440" bIns="45720" numCol="1" anchor="t" anchorCtr="0" compatLnSpc="1">
+              <a:prstTxWarp prst="textNoShape">
+                <a:avLst/>
+              </a:prstTxWarp>
+            </a:bodyPr>
+            <a:lstStyle/>
+            <a:p>
+              <a:endParaRPr lang="id-ID"/>
+            </a:p>
+          </p:txBody>
+        </p:sp>
+        <p:sp>
+          <p:nvSpPr>
+            <p:cNvPr id="89" name="Freeform 34"/>
+            <p:cNvSpPr>
+              <a:spLocks/>
+            </p:cNvSpPr>
+            <p:nvPr/>
+          </p:nvSpPr>
+          <p:spPr bwMode="auto">
+            <a:xfrm>
+              <a:off x="6797675" y="2371725"/>
+              <a:ext cx="673100" cy="60325"/>
+            </a:xfrm>
+            <a:custGeom>
+              <a:avLst/>
+              <a:gdLst>
+                <a:gd name="T0" fmla="*/ 415 w 424"/>
+                <a:gd name="T1" fmla="*/ 0 h 38"/>
+                <a:gd name="T2" fmla="*/ 7 w 424"/>
+                <a:gd name="T3" fmla="*/ 0 h 38"/>
+                <a:gd name="T4" fmla="*/ 0 w 424"/>
+                <a:gd name="T5" fmla="*/ 38 h 38"/>
+                <a:gd name="T6" fmla="*/ 424 w 424"/>
+                <a:gd name="T7" fmla="*/ 38 h 38"/>
+                <a:gd name="T8" fmla="*/ 415 w 424"/>
+                <a:gd name="T9" fmla="*/ 0 h 38"/>
+              </a:gdLst>
+              <a:ahLst/>
+              <a:cxnLst>
+                <a:cxn ang="0">
+                  <a:pos x="T0" y="T1"/>
+                </a:cxn>
+                <a:cxn ang="0">
+                  <a:pos x="T2" y="T3"/>
+                </a:cxn>
+                <a:cxn ang="0">
+                  <a:pos x="T4" y="T5"/>
+                </a:cxn>
+                <a:cxn ang="0">
+                  <a:pos x="T6" y="T7"/>
+                </a:cxn>
+                <a:cxn ang="0">
+                  <a:pos x="T8" y="T9"/>
+                </a:cxn>
+              </a:cxnLst>
+              <a:rect l="0" t="0" r="r" b="b"/>
+              <a:pathLst>
+                <a:path w="424" h="38">
+                  <a:moveTo>
+                    <a:pt x="415" y="0"/>
+                  </a:moveTo>
+                  <a:lnTo>
+                    <a:pt x="7" y="0"/>
+                  </a:lnTo>
+                  <a:lnTo>
+                    <a:pt x="0" y="38"/>
+                  </a:lnTo>
+                  <a:lnTo>
+                    <a:pt x="424" y="38"/>
+                  </a:lnTo>
+                  <a:lnTo>
+                    <a:pt x="415" y="0"/>
+                  </a:lnTo>
+                </a:path>
+              </a:pathLst>
+            </a:custGeom>
+            <a:noFill/>
+            <a:ln>
+              <a:noFill/>
+            </a:ln>
+            <a:extLst>
+              <a:ext uri="{909E8E84-426E-40dd-AFC4-6F175D3DCCD1}">
+                <a14:hiddenFill xmlns:a14="http://schemas.microsoft.com/office/drawing/2010/main" xmlns="">
+                  <a:solidFill>
+                    <a:srgbClr val="FFFFFF"/>
+                  </a:solidFill>
+                </a14:hiddenFill>
+              </a:ext>
+              <a:ext uri="{91240B29-F687-4f45-9708-019B960494DF}">
+                <a14:hiddenLine xmlns:a14="http://schemas.microsoft.com/office/drawing/2010/main" xmlns="" w="9525">
+                  <a:solidFill>
+                    <a:srgbClr val="000000"/>
+                  </a:solidFill>
+                  <a:round/>
+                  <a:headEnd/>
+                  <a:tailEnd/>
+                </a14:hiddenLine>
+              </a:ext>
+            </a:extLst>
+          </p:spPr>
+          <p:txBody>
+            <a:bodyPr vert="horz" wrap="square" lIns="91440" tIns="45720" rIns="91440" bIns="45720" numCol="1" anchor="t" anchorCtr="0" compatLnSpc="1">
+              <a:prstTxWarp prst="textNoShape">
+                <a:avLst/>
+              </a:prstTxWarp>
+            </a:bodyPr>
+            <a:lstStyle/>
+            <a:p>
+              <a:endParaRPr lang="id-ID"/>
+            </a:p>
+          </p:txBody>
+        </p:sp>
+      </p:grpSp>
+      <p:pic>
+        <p:nvPicPr>
+          <p:cNvPr id="75" name="Picture Placeholder 2"/>
+          <p:cNvPicPr>
+            <a:picLocks noChangeAspect="1"/>
+          </p:cNvPicPr>
+          <p:nvPr/>
+        </p:nvPicPr>
+        <p:blipFill>
+          <a:blip r:embed="rId5" cstate="print">
+            <a:extLst>
+              <a:ext uri="{28A0092B-C50C-407E-A947-70E740481C1C}">
+                <a14:useLocalDpi xmlns:a14="http://schemas.microsoft.com/office/drawing/2010/main" val="0"/>
+              </a:ext>
+            </a:extLst>
+          </a:blip>
+          <a:srcRect l="16635" r="16635"/>
+          <a:stretch>
+            <a:fillRect/>
+          </a:stretch>
+        </p:blipFill>
+        <p:spPr>
+          <a:xfrm>
+            <a:off x="827845" y="1145352"/>
+            <a:ext cx="968545" cy="961647"/>
+          </a:xfrm>
+          <a:prstGeom prst="ellipse">
+            <a:avLst/>
+          </a:prstGeom>
+        </p:spPr>
+      </p:pic>
+      <p:cxnSp>
+        <p:nvCxnSpPr>
+          <p:cNvPr id="90" name="Straight Connector 89"/>
+          <p:cNvCxnSpPr/>
+          <p:nvPr/>
+        </p:nvCxnSpPr>
+        <p:spPr>
+          <a:xfrm>
+            <a:off x="3438546" y="1957048"/>
+            <a:ext cx="3207721" cy="12072"/>
+          </a:xfrm>
+          <a:prstGeom prst="line">
+            <a:avLst/>
+          </a:prstGeom>
+          <a:ln w="38100">
+            <a:solidFill>
+              <a:schemeClr val="bg1">
+                <a:lumMod val="75000"/>
+              </a:schemeClr>
+            </a:solidFill>
+            <a:prstDash val="solid"/>
+            <a:headEnd type="triangle" w="med" len="med"/>
+            <a:tailEnd type="triangle" w="med" len="med"/>
+          </a:ln>
+        </p:spPr>
+        <p:style>
+          <a:lnRef idx="1">
+            <a:schemeClr val="accent1"/>
+          </a:lnRef>
+          <a:fillRef idx="0">
+            <a:schemeClr val="accent1"/>
+          </a:fillRef>
+          <a:effectRef idx="0">
+            <a:schemeClr val="accent1"/>
+          </a:effectRef>
+          <a:fontRef idx="minor">
+            <a:schemeClr val="tx1"/>
+          </a:fontRef>
+        </p:style>
+      </p:cxnSp>
+      <p:sp>
+        <p:nvSpPr>
+          <p:cNvPr id="94" name="TextBox 93"/>
+          <p:cNvSpPr txBox="1"/>
+          <p:nvPr/>
+        </p:nvSpPr>
+        <p:spPr>
+          <a:xfrm>
+            <a:off x="1575682" y="2712928"/>
+            <a:ext cx="1298534" cy="307777"/>
+          </a:xfrm>
+          <a:prstGeom prst="rect">
+            <a:avLst/>
+          </a:prstGeom>
+          <a:noFill/>
+        </p:spPr>
+        <p:txBody>
+          <a:bodyPr wrap="square" rtlCol="0">
+            <a:spAutoFit/>
+          </a:bodyPr>
+          <a:lstStyle/>
+          <a:p>
+            <a:pPr algn="ctr"/>
+            <a:r>
+              <a:rPr lang="id-ID" sz="1400" dirty="0" err="1" smtClean="0">
+                <a:solidFill>
+                  <a:schemeClr val="bg1"/>
+                </a:solidFill>
+                <a:latin typeface="+mj-lt"/>
+              </a:rPr>
+              <a:t>Client</a:t>
+            </a:r>
+            <a:endParaRPr lang="id-ID" sz="1400" dirty="0">
+              <a:solidFill>
+                <a:schemeClr val="bg1"/>
+              </a:solidFill>
+              <a:latin typeface="+mj-lt"/>
+            </a:endParaRPr>
+          </a:p>
+        </p:txBody>
+      </p:sp>
+      <p:sp>
+        <p:nvSpPr>
+          <p:cNvPr id="98" name="TextBox 97"/>
+          <p:cNvSpPr txBox="1"/>
+          <p:nvPr/>
+        </p:nvSpPr>
+        <p:spPr>
+          <a:xfrm>
+            <a:off x="2793318" y="268876"/>
+            <a:ext cx="6875831" cy="830997"/>
+          </a:xfrm>
+          <a:prstGeom prst="rect">
+            <a:avLst/>
+          </a:prstGeom>
+          <a:noFill/>
+        </p:spPr>
+        <p:txBody>
+          <a:bodyPr wrap="square" rtlCol="0">
+            <a:spAutoFit/>
+          </a:bodyPr>
+          <a:lstStyle/>
+          <a:p>
+            <a:pPr algn="ctr"/>
+            <a:r>
+              <a:rPr lang="id-ID" sz="4800" b="1" dirty="0" err="1" smtClean="0">
+                <a:solidFill>
+                  <a:schemeClr val="bg1"/>
+                </a:solidFill>
+              </a:rPr>
+              <a:t>Workshop</a:t>
+            </a:r>
+            <a:r>
+              <a:rPr lang="id-ID" sz="4800" b="1" dirty="0" smtClean="0">
+                <a:solidFill>
+                  <a:schemeClr val="bg1"/>
+                </a:solidFill>
+              </a:rPr>
+              <a:t>: </a:t>
+            </a:r>
+            <a:r>
+              <a:rPr lang="id-ID" sz="4800" b="1" dirty="0" err="1" smtClean="0">
+                <a:solidFill>
+                  <a:schemeClr val="bg1"/>
+                </a:solidFill>
+              </a:rPr>
+              <a:t>Back</a:t>
+            </a:r>
+            <a:r>
+              <a:rPr lang="id-ID" sz="4800" b="1" dirty="0" smtClean="0">
+                <a:solidFill>
+                  <a:schemeClr val="bg1"/>
+                </a:solidFill>
+              </a:rPr>
+              <a:t> </a:t>
+            </a:r>
+            <a:r>
+              <a:rPr lang="id-ID" sz="4800" b="1" dirty="0" err="1" smtClean="0">
+                <a:solidFill>
+                  <a:schemeClr val="bg1"/>
+                </a:solidFill>
+              </a:rPr>
+              <a:t>End</a:t>
+            </a:r>
+            <a:endParaRPr lang="id-ID" sz="4800" b="1" dirty="0">
+              <a:solidFill>
+                <a:schemeClr val="bg1"/>
+              </a:solidFill>
+            </a:endParaRPr>
+          </a:p>
+        </p:txBody>
+      </p:sp>
+      <p:pic>
+        <p:nvPicPr>
+          <p:cNvPr id="2" name="Picture 1"/>
+          <p:cNvPicPr>
+            <a:picLocks noChangeAspect="1"/>
+          </p:cNvPicPr>
+          <p:nvPr/>
+        </p:nvPicPr>
+        <p:blipFill>
+          <a:blip r:embed="rId6">
+            <a:extLst>
+              <a:ext uri="{28A0092B-C50C-407E-A947-70E740481C1C}">
+                <a14:useLocalDpi xmlns:a14="http://schemas.microsoft.com/office/drawing/2010/main" val="0"/>
+              </a:ext>
+            </a:extLst>
+          </a:blip>
+          <a:stretch>
+            <a:fillRect/>
+          </a:stretch>
+        </p:blipFill>
+        <p:spPr>
+          <a:xfrm>
+            <a:off x="6549481" y="5379523"/>
+            <a:ext cx="940154" cy="940154"/>
+          </a:xfrm>
+          <a:prstGeom prst="rect">
+            <a:avLst/>
+          </a:prstGeom>
+        </p:spPr>
+      </p:pic>
+      <p:sp>
+        <p:nvSpPr>
+          <p:cNvPr id="54" name="TextBox 53"/>
+          <p:cNvSpPr txBox="1"/>
+          <p:nvPr/>
+        </p:nvSpPr>
+        <p:spPr>
+          <a:xfrm>
+            <a:off x="9205995" y="2832115"/>
+            <a:ext cx="1583703" cy="307777"/>
+          </a:xfrm>
+          <a:prstGeom prst="rect">
+            <a:avLst/>
+          </a:prstGeom>
+          <a:noFill/>
+        </p:spPr>
+        <p:txBody>
+          <a:bodyPr wrap="none" rtlCol="0">
+            <a:spAutoFit/>
+          </a:bodyPr>
+          <a:lstStyle/>
+          <a:p>
+            <a:pPr algn="ctr"/>
+            <a:r>
+              <a:rPr lang="en-US" sz="1400" b="1" dirty="0" smtClean="0">
+                <a:solidFill>
+                  <a:schemeClr val="bg1"/>
+                </a:solidFill>
+                <a:latin typeface="Calibri" charset="0"/>
+                <a:ea typeface="Calibri" charset="0"/>
+                <a:cs typeface="Calibri" charset="0"/>
+              </a:rPr>
+              <a:t>Custom Authorizer</a:t>
+            </a:r>
+            <a:endParaRPr lang="id-ID" sz="1400" b="1" dirty="0">
+              <a:solidFill>
+                <a:schemeClr val="bg1"/>
+              </a:solidFill>
+              <a:latin typeface="Calibri" charset="0"/>
+              <a:ea typeface="Calibri" charset="0"/>
+              <a:cs typeface="Calibri" charset="0"/>
+            </a:endParaRPr>
+          </a:p>
+        </p:txBody>
+      </p:sp>
+      <p:sp>
+        <p:nvSpPr>
+          <p:cNvPr id="56" name="TextBox 55"/>
+          <p:cNvSpPr txBox="1"/>
+          <p:nvPr/>
+        </p:nvSpPr>
+        <p:spPr>
+          <a:xfrm>
+            <a:off x="7524107" y="3732544"/>
+            <a:ext cx="1513556" cy="523220"/>
+          </a:xfrm>
+          <a:prstGeom prst="rect">
+            <a:avLst/>
+          </a:prstGeom>
+          <a:noFill/>
+        </p:spPr>
+        <p:txBody>
+          <a:bodyPr wrap="none" rtlCol="0">
+            <a:spAutoFit/>
+          </a:bodyPr>
+          <a:lstStyle/>
+          <a:p>
+            <a:pPr algn="ctr"/>
+            <a:r>
+              <a:rPr lang="en-US" sz="1400" b="1" smtClean="0">
+                <a:solidFill>
+                  <a:schemeClr val="bg1"/>
+                </a:solidFill>
+                <a:latin typeface="Calibri" charset="0"/>
+                <a:ea typeface="Calibri" charset="0"/>
+                <a:cs typeface="Calibri" charset="0"/>
+              </a:rPr>
+              <a:t>Lambda Function:</a:t>
+            </a:r>
+            <a:br>
+              <a:rPr lang="en-US" sz="1400" b="1" smtClean="0">
+                <a:solidFill>
+                  <a:schemeClr val="bg1"/>
+                </a:solidFill>
+                <a:latin typeface="Calibri" charset="0"/>
+                <a:ea typeface="Calibri" charset="0"/>
+                <a:cs typeface="Calibri" charset="0"/>
+              </a:rPr>
+            </a:br>
+            <a:r>
+              <a:rPr lang="en-US" sz="1400" b="1" smtClean="0">
+                <a:solidFill>
+                  <a:schemeClr val="bg1"/>
+                </a:solidFill>
+                <a:latin typeface="Calibri" charset="0"/>
+                <a:ea typeface="Calibri" charset="0"/>
+                <a:cs typeface="Calibri" charset="0"/>
+              </a:rPr>
+              <a:t>get-user-profile</a:t>
+            </a:r>
+            <a:endParaRPr lang="id-ID" sz="1400" b="1" dirty="0">
+              <a:solidFill>
+                <a:schemeClr val="bg1"/>
+              </a:solidFill>
+              <a:latin typeface="Calibri" charset="0"/>
+              <a:ea typeface="Calibri" charset="0"/>
+              <a:cs typeface="Calibri" charset="0"/>
+            </a:endParaRPr>
+          </a:p>
+        </p:txBody>
+      </p:sp>
+      <p:sp>
+        <p:nvSpPr>
+          <p:cNvPr id="57" name="TextBox 56"/>
+          <p:cNvSpPr txBox="1"/>
+          <p:nvPr/>
+        </p:nvSpPr>
+        <p:spPr>
+          <a:xfrm>
+            <a:off x="7723360" y="5635650"/>
+            <a:ext cx="933269" cy="307777"/>
+          </a:xfrm>
+          <a:prstGeom prst="rect">
+            <a:avLst/>
+          </a:prstGeom>
+          <a:noFill/>
+        </p:spPr>
+        <p:txBody>
+          <a:bodyPr wrap="none" rtlCol="0">
+            <a:spAutoFit/>
+          </a:bodyPr>
+          <a:lstStyle/>
+          <a:p>
+            <a:pPr algn="ctr"/>
+            <a:r>
+              <a:rPr lang="en-US" sz="1400" b="1" smtClean="0">
+                <a:solidFill>
+                  <a:schemeClr val="bg1"/>
+                </a:solidFill>
+                <a:latin typeface="Calibri" charset="0"/>
+                <a:ea typeface="Calibri" charset="0"/>
+                <a:cs typeface="Calibri" charset="0"/>
+              </a:rPr>
+              <a:t>Auth0 API</a:t>
+            </a:r>
+            <a:endParaRPr lang="id-ID" sz="1400" b="1" dirty="0">
+              <a:solidFill>
+                <a:schemeClr val="bg1"/>
+              </a:solidFill>
+              <a:latin typeface="Calibri" charset="0"/>
+              <a:ea typeface="Calibri" charset="0"/>
+              <a:cs typeface="Calibri" charset="0"/>
+            </a:endParaRPr>
+          </a:p>
+        </p:txBody>
+      </p:sp>
+      <p:cxnSp>
+        <p:nvCxnSpPr>
+          <p:cNvPr id="58" name="Straight Connector 57"/>
+          <p:cNvCxnSpPr>
+            <a:stCxn id="218" idx="2"/>
+          </p:cNvCxnSpPr>
+          <p:nvPr/>
+        </p:nvCxnSpPr>
+        <p:spPr>
+          <a:xfrm>
+            <a:off x="7019558" y="4411620"/>
+            <a:ext cx="0" cy="907842"/>
+          </a:xfrm>
+          <a:prstGeom prst="line">
+            <a:avLst/>
+          </a:prstGeom>
+          <a:ln w="38100">
+            <a:solidFill>
+              <a:schemeClr val="bg1">
+                <a:lumMod val="75000"/>
+              </a:schemeClr>
+            </a:solidFill>
+            <a:prstDash val="solid"/>
+            <a:headEnd type="triangle"/>
+            <a:tailEnd type="stealth"/>
+          </a:ln>
+        </p:spPr>
+        <p:style>
+          <a:lnRef idx="1">
+            <a:schemeClr val="accent1"/>
+          </a:lnRef>
+          <a:fillRef idx="0">
+            <a:schemeClr val="accent1"/>
+          </a:fillRef>
+          <a:effectRef idx="0">
+            <a:schemeClr val="accent1"/>
+          </a:effectRef>
+          <a:fontRef idx="minor">
+            <a:schemeClr val="tx1"/>
+          </a:fontRef>
+        </p:style>
+      </p:cxnSp>
+    </p:spTree>
+    <p:extLst>
+      <p:ext uri="{BB962C8B-B14F-4D97-AF65-F5344CB8AC3E}">
+        <p14:creationId xmlns:p14="http://schemas.microsoft.com/office/powerpoint/2010/main" val="791786484"/>
+      </p:ext>
+    </p:extLst>
+  </p:cSld>
+  <p:clrMapOvr>
+    <a:masterClrMapping/>
+  </p:clrMapOvr>
+  <p:transition>
+    <p:push dir="u"/>
+  </p:transition>
+  <p:timing>
+    <p:tnLst>
+      <p:par>
+        <p:cTn id="1" dur="indefinite" restart="never" nodeType="tmRoot"/>
+      </p:par>
+    </p:tnLst>
+  </p:timing>
+</p:sld>
+</file>
+
+<file path=ppt/slides/slide6.xml><?xml version="1.0" encoding="utf-8"?>
 <p:sld xmlns:a="http://schemas.openxmlformats.org/drawingml/2006/main" xmlns:r="http://schemas.openxmlformats.org/officeDocument/2006/relationships" xmlns:p="http://schemas.openxmlformats.org/presentationml/2006/main">
   <p:cSld>
     <p:bg>
@@ -34323,7 +39167,7 @@
 </p:sld>
 </file>
 
-<file path=ppt/slides/slide5.xml><?xml version="1.0" encoding="utf-8"?>
+<file path=ppt/slides/slide7.xml><?xml version="1.0" encoding="utf-8"?>
 <p:sld xmlns:a="http://schemas.openxmlformats.org/drawingml/2006/main" xmlns:r="http://schemas.openxmlformats.org/officeDocument/2006/relationships" xmlns:p="http://schemas.openxmlformats.org/presentationml/2006/main">
   <p:cSld>
     <p:bg>

</xml_diff>